<commit_message>
beta - iNVERSED GAMMA
</commit_message>
<xml_diff>
--- a/Report/rprt_11_9_21.pptx
+++ b/Report/rprt_11_9_21.pptx
@@ -15,6 +15,12 @@
     <p:sldId id="266" r:id="rId9"/>
     <p:sldId id="261" r:id="rId10"/>
     <p:sldId id="263" r:id="rId11"/>
+    <p:sldId id="267" r:id="rId12"/>
+    <p:sldId id="268" r:id="rId13"/>
+    <p:sldId id="269" r:id="rId14"/>
+    <p:sldId id="270" r:id="rId15"/>
+    <p:sldId id="271" r:id="rId16"/>
+    <p:sldId id="272" r:id="rId17"/>
   </p:sldIdLst>
   <p:sldSz cx="12192000" cy="6858000"/>
   <p:notesSz cx="6858000" cy="9144000"/>
@@ -113,7 +119,260 @@
       </a:defRPr>
     </a:lvl9pPr>
   </p:defaultTextStyle>
+  <p:extLst>
+    <p:ext uri="{EFAFB233-063F-42B5-8137-9DF3F51BA10A}">
+      <p15:sldGuideLst xmlns:p15="http://schemas.microsoft.com/office/powerpoint/2012/main"/>
+    </p:ext>
+  </p:extLst>
 </p:presentation>
+</file>
+
+<file path=ppt/revisionInfo.xml><?xml version="1.0" encoding="utf-8"?>
+<p1510:revInfo xmlns:a="http://schemas.openxmlformats.org/drawingml/2006/main" xmlns:r="http://schemas.openxmlformats.org/officeDocument/2006/relationships" xmlns:p1510="http://schemas.microsoft.com/office/powerpoint/2015/10/main">
+  <p1510:revLst>
+    <p1510:client id="{50E62AC6-9771-413B-A9F0-42B864317433}" v="61" dt="2021-11-09T19:36:25.966"/>
+  </p1510:revLst>
+</p1510:revInfo>
+</file>
+
+<file path=ppt/changesInfos/changesInfo1.xml><?xml version="1.0" encoding="utf-8"?>
+<pc:chgInfo xmlns:a="http://schemas.openxmlformats.org/drawingml/2006/main" xmlns:r="http://schemas.openxmlformats.org/officeDocument/2006/relationships" xmlns:ac="http://schemas.microsoft.com/office/drawing/2013/main/command" xmlns:pc="http://schemas.microsoft.com/office/powerpoint/2013/main/command">
+  <pc:docChgLst>
+    <pc:chgData name="Saadati Fard, Reza" userId="25acf688-aded-4b6f-af4e-29555bb6f857" providerId="ADAL" clId="{50E62AC6-9771-413B-A9F0-42B864317433}"/>
+    <pc:docChg chg="undo custSel addSld modSld sldOrd">
+      <pc:chgData name="Saadati Fard, Reza" userId="25acf688-aded-4b6f-af4e-29555bb6f857" providerId="ADAL" clId="{50E62AC6-9771-413B-A9F0-42B864317433}" dt="2021-11-09T19:36:42.212" v="207"/>
+      <pc:docMkLst>
+        <pc:docMk/>
+      </pc:docMkLst>
+      <pc:sldChg chg="addSp delSp modSp new mod">
+        <pc:chgData name="Saadati Fard, Reza" userId="25acf688-aded-4b6f-af4e-29555bb6f857" providerId="ADAL" clId="{50E62AC6-9771-413B-A9F0-42B864317433}" dt="2021-11-09T18:56:15.252" v="97" actId="478"/>
+        <pc:sldMkLst>
+          <pc:docMk/>
+          <pc:sldMk cId="2677609294" sldId="267"/>
+        </pc:sldMkLst>
+        <pc:spChg chg="mod">
+          <ac:chgData name="Saadati Fard, Reza" userId="25acf688-aded-4b6f-af4e-29555bb6f857" providerId="ADAL" clId="{50E62AC6-9771-413B-A9F0-42B864317433}" dt="2021-11-09T18:56:05.326" v="95" actId="20577"/>
+          <ac:spMkLst>
+            <pc:docMk/>
+            <pc:sldMk cId="2677609294" sldId="267"/>
+            <ac:spMk id="2" creationId="{94B378F5-CB08-436A-8F23-0972B205A727}"/>
+          </ac:spMkLst>
+        </pc:spChg>
+        <pc:spChg chg="mod">
+          <ac:chgData name="Saadati Fard, Reza" userId="25acf688-aded-4b6f-af4e-29555bb6f857" providerId="ADAL" clId="{50E62AC6-9771-413B-A9F0-42B864317433}" dt="2021-11-09T18:54:30.584" v="93"/>
+          <ac:spMkLst>
+            <pc:docMk/>
+            <pc:sldMk cId="2677609294" sldId="267"/>
+            <ac:spMk id="3" creationId="{7B0B8F2F-10D7-4BB1-9DCB-602E9354C43F}"/>
+          </ac:spMkLst>
+        </pc:spChg>
+        <pc:spChg chg="add del">
+          <ac:chgData name="Saadati Fard, Reza" userId="25acf688-aded-4b6f-af4e-29555bb6f857" providerId="ADAL" clId="{50E62AC6-9771-413B-A9F0-42B864317433}" dt="2021-11-09T18:56:15.252" v="97" actId="478"/>
+          <ac:spMkLst>
+            <pc:docMk/>
+            <pc:sldMk cId="2677609294" sldId="267"/>
+            <ac:spMk id="8" creationId="{3F5011D9-F0E0-4EFD-9566-A7978EA7D5A8}"/>
+          </ac:spMkLst>
+        </pc:spChg>
+        <pc:picChg chg="add mod">
+          <ac:chgData name="Saadati Fard, Reza" userId="25acf688-aded-4b6f-af4e-29555bb6f857" providerId="ADAL" clId="{50E62AC6-9771-413B-A9F0-42B864317433}" dt="2021-11-09T18:53:31.110" v="72" actId="1076"/>
+          <ac:picMkLst>
+            <pc:docMk/>
+            <pc:sldMk cId="2677609294" sldId="267"/>
+            <ac:picMk id="5" creationId="{BA546176-B1B2-40A0-A998-0F872E64ADD1}"/>
+          </ac:picMkLst>
+        </pc:picChg>
+        <pc:picChg chg="add del mod">
+          <ac:chgData name="Saadati Fard, Reza" userId="25acf688-aded-4b6f-af4e-29555bb6f857" providerId="ADAL" clId="{50E62AC6-9771-413B-A9F0-42B864317433}" dt="2021-11-09T18:53:28.419" v="71" actId="478"/>
+          <ac:picMkLst>
+            <pc:docMk/>
+            <pc:sldMk cId="2677609294" sldId="267"/>
+            <ac:picMk id="7" creationId="{65E3341C-E563-4BB7-9840-E2842F672A81}"/>
+          </ac:picMkLst>
+        </pc:picChg>
+      </pc:sldChg>
+      <pc:sldChg chg="addSp delSp modSp add mod ord">
+        <pc:chgData name="Saadati Fard, Reza" userId="25acf688-aded-4b6f-af4e-29555bb6f857" providerId="ADAL" clId="{50E62AC6-9771-413B-A9F0-42B864317433}" dt="2021-11-09T19:20:52.111" v="169"/>
+        <pc:sldMkLst>
+          <pc:docMk/>
+          <pc:sldMk cId="1053905848" sldId="268"/>
+        </pc:sldMkLst>
+        <pc:spChg chg="mod">
+          <ac:chgData name="Saadati Fard, Reza" userId="25acf688-aded-4b6f-af4e-29555bb6f857" providerId="ADAL" clId="{50E62AC6-9771-413B-A9F0-42B864317433}" dt="2021-11-09T18:56:23.950" v="100" actId="20577"/>
+          <ac:spMkLst>
+            <pc:docMk/>
+            <pc:sldMk cId="1053905848" sldId="268"/>
+            <ac:spMk id="2" creationId="{94B378F5-CB08-436A-8F23-0972B205A727}"/>
+          </ac:spMkLst>
+        </pc:spChg>
+        <pc:spChg chg="mod">
+          <ac:chgData name="Saadati Fard, Reza" userId="25acf688-aded-4b6f-af4e-29555bb6f857" providerId="ADAL" clId="{50E62AC6-9771-413B-A9F0-42B864317433}" dt="2021-11-09T18:57:25.907" v="103"/>
+          <ac:spMkLst>
+            <pc:docMk/>
+            <pc:sldMk cId="1053905848" sldId="268"/>
+            <ac:spMk id="3" creationId="{7B0B8F2F-10D7-4BB1-9DCB-602E9354C43F}"/>
+          </ac:spMkLst>
+        </pc:spChg>
+        <pc:picChg chg="del">
+          <ac:chgData name="Saadati Fard, Reza" userId="25acf688-aded-4b6f-af4e-29555bb6f857" providerId="ADAL" clId="{50E62AC6-9771-413B-A9F0-42B864317433}" dt="2021-11-09T19:00:01.307" v="104" actId="478"/>
+          <ac:picMkLst>
+            <pc:docMk/>
+            <pc:sldMk cId="1053905848" sldId="268"/>
+            <ac:picMk id="5" creationId="{BA546176-B1B2-40A0-A998-0F872E64ADD1}"/>
+          </ac:picMkLst>
+        </pc:picChg>
+        <pc:picChg chg="add mod">
+          <ac:chgData name="Saadati Fard, Reza" userId="25acf688-aded-4b6f-af4e-29555bb6f857" providerId="ADAL" clId="{50E62AC6-9771-413B-A9F0-42B864317433}" dt="2021-11-09T19:01:35.664" v="106" actId="1076"/>
+          <ac:picMkLst>
+            <pc:docMk/>
+            <pc:sldMk cId="1053905848" sldId="268"/>
+            <ac:picMk id="6" creationId="{47AF8834-69AB-44D6-B19C-F2B79BD65090}"/>
+          </ac:picMkLst>
+        </pc:picChg>
+      </pc:sldChg>
+      <pc:sldChg chg="addSp modSp new mod chgLayout">
+        <pc:chgData name="Saadati Fard, Reza" userId="25acf688-aded-4b6f-af4e-29555bb6f857" providerId="ADAL" clId="{50E62AC6-9771-413B-A9F0-42B864317433}" dt="2021-11-09T19:20:43.600" v="167" actId="20577"/>
+        <pc:sldMkLst>
+          <pc:docMk/>
+          <pc:sldMk cId="900705648" sldId="269"/>
+        </pc:sldMkLst>
+        <pc:spChg chg="mod ord">
+          <ac:chgData name="Saadati Fard, Reza" userId="25acf688-aded-4b6f-af4e-29555bb6f857" providerId="ADAL" clId="{50E62AC6-9771-413B-A9F0-42B864317433}" dt="2021-11-09T19:18:11.532" v="159" actId="700"/>
+          <ac:spMkLst>
+            <pc:docMk/>
+            <pc:sldMk cId="900705648" sldId="269"/>
+            <ac:spMk id="2" creationId="{CCBBFE0B-FB2B-4D56-953D-CF2B45A5FD5F}"/>
+          </ac:spMkLst>
+        </pc:spChg>
+        <pc:spChg chg="mod ord">
+          <ac:chgData name="Saadati Fard, Reza" userId="25acf688-aded-4b6f-af4e-29555bb6f857" providerId="ADAL" clId="{50E62AC6-9771-413B-A9F0-42B864317433}" dt="2021-11-09T19:18:11.532" v="159" actId="700"/>
+          <ac:spMkLst>
+            <pc:docMk/>
+            <pc:sldMk cId="900705648" sldId="269"/>
+            <ac:spMk id="3" creationId="{ADCE720B-ACA3-4266-910F-47D85CD0AB03}"/>
+          </ac:spMkLst>
+        </pc:spChg>
+        <pc:spChg chg="add mod">
+          <ac:chgData name="Saadati Fard, Reza" userId="25acf688-aded-4b6f-af4e-29555bb6f857" providerId="ADAL" clId="{50E62AC6-9771-413B-A9F0-42B864317433}" dt="2021-11-09T19:20:43.600" v="167" actId="20577"/>
+          <ac:spMkLst>
+            <pc:docMk/>
+            <pc:sldMk cId="900705648" sldId="269"/>
+            <ac:spMk id="7" creationId="{A4FF0A56-F7F1-4768-A3BA-E6C82DAA6C7B}"/>
+          </ac:spMkLst>
+        </pc:spChg>
+        <pc:picChg chg="add mod">
+          <ac:chgData name="Saadati Fard, Reza" userId="25acf688-aded-4b6f-af4e-29555bb6f857" providerId="ADAL" clId="{50E62AC6-9771-413B-A9F0-42B864317433}" dt="2021-11-09T19:18:57.137" v="162" actId="1076"/>
+          <ac:picMkLst>
+            <pc:docMk/>
+            <pc:sldMk cId="900705648" sldId="269"/>
+            <ac:picMk id="5" creationId="{DF94AFCE-DC30-48FD-9163-7595E5C301E7}"/>
+          </ac:picMkLst>
+        </pc:picChg>
+      </pc:sldChg>
+      <pc:sldChg chg="modSp add mod">
+        <pc:chgData name="Saadati Fard, Reza" userId="25acf688-aded-4b6f-af4e-29555bb6f857" providerId="ADAL" clId="{50E62AC6-9771-413B-A9F0-42B864317433}" dt="2021-11-09T19:21:48.495" v="174" actId="20577"/>
+        <pc:sldMkLst>
+          <pc:docMk/>
+          <pc:sldMk cId="2056364223" sldId="270"/>
+        </pc:sldMkLst>
+        <pc:spChg chg="mod">
+          <ac:chgData name="Saadati Fard, Reza" userId="25acf688-aded-4b6f-af4e-29555bb6f857" providerId="ADAL" clId="{50E62AC6-9771-413B-A9F0-42B864317433}" dt="2021-11-09T19:21:02.833" v="172" actId="20577"/>
+          <ac:spMkLst>
+            <pc:docMk/>
+            <pc:sldMk cId="2056364223" sldId="270"/>
+            <ac:spMk id="2" creationId="{CCBBFE0B-FB2B-4D56-953D-CF2B45A5FD5F}"/>
+          </ac:spMkLst>
+        </pc:spChg>
+        <pc:spChg chg="mod">
+          <ac:chgData name="Saadati Fard, Reza" userId="25acf688-aded-4b6f-af4e-29555bb6f857" providerId="ADAL" clId="{50E62AC6-9771-413B-A9F0-42B864317433}" dt="2021-11-09T19:21:48.495" v="174" actId="20577"/>
+          <ac:spMkLst>
+            <pc:docMk/>
+            <pc:sldMk cId="2056364223" sldId="270"/>
+            <ac:spMk id="7" creationId="{A4FF0A56-F7F1-4768-A3BA-E6C82DAA6C7B}"/>
+          </ac:spMkLst>
+        </pc:spChg>
+      </pc:sldChg>
+      <pc:sldChg chg="addSp delSp modSp add mod">
+        <pc:chgData name="Saadati Fard, Reza" userId="25acf688-aded-4b6f-af4e-29555bb6f857" providerId="ADAL" clId="{50E62AC6-9771-413B-A9F0-42B864317433}" dt="2021-11-09T19:36:42.212" v="207"/>
+        <pc:sldMkLst>
+          <pc:docMk/>
+          <pc:sldMk cId="4241150814" sldId="271"/>
+        </pc:sldMkLst>
+        <pc:spChg chg="mod">
+          <ac:chgData name="Saadati Fard, Reza" userId="25acf688-aded-4b6f-af4e-29555bb6f857" providerId="ADAL" clId="{50E62AC6-9771-413B-A9F0-42B864317433}" dt="2021-11-09T19:36:42.212" v="207"/>
+          <ac:spMkLst>
+            <pc:docMk/>
+            <pc:sldMk cId="4241150814" sldId="271"/>
+            <ac:spMk id="3" creationId="{ADCE720B-ACA3-4266-910F-47D85CD0AB03}"/>
+          </ac:spMkLst>
+        </pc:spChg>
+        <pc:spChg chg="del">
+          <ac:chgData name="Saadati Fard, Reza" userId="25acf688-aded-4b6f-af4e-29555bb6f857" providerId="ADAL" clId="{50E62AC6-9771-413B-A9F0-42B864317433}" dt="2021-11-09T19:23:02.562" v="182" actId="478"/>
+          <ac:spMkLst>
+            <pc:docMk/>
+            <pc:sldMk cId="4241150814" sldId="271"/>
+            <ac:spMk id="7" creationId="{A4FF0A56-F7F1-4768-A3BA-E6C82DAA6C7B}"/>
+          </ac:spMkLst>
+        </pc:spChg>
+        <pc:picChg chg="del">
+          <ac:chgData name="Saadati Fard, Reza" userId="25acf688-aded-4b6f-af4e-29555bb6f857" providerId="ADAL" clId="{50E62AC6-9771-413B-A9F0-42B864317433}" dt="2021-11-09T19:23:11.518" v="184" actId="478"/>
+          <ac:picMkLst>
+            <pc:docMk/>
+            <pc:sldMk cId="4241150814" sldId="271"/>
+            <ac:picMk id="5" creationId="{DF94AFCE-DC30-48FD-9163-7595E5C301E7}"/>
+          </ac:picMkLst>
+        </pc:picChg>
+        <pc:picChg chg="add mod">
+          <ac:chgData name="Saadati Fard, Reza" userId="25acf688-aded-4b6f-af4e-29555bb6f857" providerId="ADAL" clId="{50E62AC6-9771-413B-A9F0-42B864317433}" dt="2021-11-09T19:36:13.537" v="201" actId="1076"/>
+          <ac:picMkLst>
+            <pc:docMk/>
+            <pc:sldMk cId="4241150814" sldId="271"/>
+            <ac:picMk id="6" creationId="{BC279BB7-2118-4FD4-9899-DC0EEDFBF1C1}"/>
+          </ac:picMkLst>
+        </pc:picChg>
+      </pc:sldChg>
+      <pc:sldChg chg="addSp delSp modSp add mod">
+        <pc:chgData name="Saadati Fard, Reza" userId="25acf688-aded-4b6f-af4e-29555bb6f857" providerId="ADAL" clId="{50E62AC6-9771-413B-A9F0-42B864317433}" dt="2021-11-09T19:35:32.289" v="199" actId="1076"/>
+        <pc:sldMkLst>
+          <pc:docMk/>
+          <pc:sldMk cId="3443346089" sldId="272"/>
+        </pc:sldMkLst>
+        <pc:spChg chg="mod">
+          <ac:chgData name="Saadati Fard, Reza" userId="25acf688-aded-4b6f-af4e-29555bb6f857" providerId="ADAL" clId="{50E62AC6-9771-413B-A9F0-42B864317433}" dt="2021-11-09T19:32:43.442" v="194"/>
+          <ac:spMkLst>
+            <pc:docMk/>
+            <pc:sldMk cId="3443346089" sldId="272"/>
+            <ac:spMk id="3" creationId="{ADCE720B-ACA3-4266-910F-47D85CD0AB03}"/>
+          </ac:spMkLst>
+        </pc:spChg>
+        <pc:spChg chg="del">
+          <ac:chgData name="Saadati Fard, Reza" userId="25acf688-aded-4b6f-af4e-29555bb6f857" providerId="ADAL" clId="{50E62AC6-9771-413B-A9F0-42B864317433}" dt="2021-11-09T19:23:06.654" v="183" actId="478"/>
+          <ac:spMkLst>
+            <pc:docMk/>
+            <pc:sldMk cId="3443346089" sldId="272"/>
+            <ac:spMk id="7" creationId="{A4FF0A56-F7F1-4768-A3BA-E6C82DAA6C7B}"/>
+          </ac:spMkLst>
+        </pc:spChg>
+        <pc:picChg chg="del">
+          <ac:chgData name="Saadati Fard, Reza" userId="25acf688-aded-4b6f-af4e-29555bb6f857" providerId="ADAL" clId="{50E62AC6-9771-413B-A9F0-42B864317433}" dt="2021-11-09T19:23:17.038" v="185" actId="478"/>
+          <ac:picMkLst>
+            <pc:docMk/>
+            <pc:sldMk cId="3443346089" sldId="272"/>
+            <ac:picMk id="5" creationId="{DF94AFCE-DC30-48FD-9163-7595E5C301E7}"/>
+          </ac:picMkLst>
+        </pc:picChg>
+        <pc:picChg chg="add mod">
+          <ac:chgData name="Saadati Fard, Reza" userId="25acf688-aded-4b6f-af4e-29555bb6f857" providerId="ADAL" clId="{50E62AC6-9771-413B-A9F0-42B864317433}" dt="2021-11-09T19:35:32.289" v="199" actId="1076"/>
+          <ac:picMkLst>
+            <pc:docMk/>
+            <pc:sldMk cId="3443346089" sldId="272"/>
+            <ac:picMk id="6" creationId="{0D84F652-3085-4256-B292-69CCFCAFBF77}"/>
+          </ac:picMkLst>
+        </pc:picChg>
+      </pc:sldChg>
+    </pc:docChg>
+  </pc:docChgLst>
+</pc:chgInfo>
 </file>
 
 <file path=ppt/slideLayouts/slideLayout1.xml><?xml version="1.0" encoding="utf-8"?>
@@ -3733,6 +3992,2795 @@
     <p:extLst>
       <p:ext uri="{BB962C8B-B14F-4D97-AF65-F5344CB8AC3E}">
         <p14:creationId xmlns:p14="http://schemas.microsoft.com/office/powerpoint/2010/main" val="4237720895"/>
+      </p:ext>
+    </p:extLst>
+  </p:cSld>
+  <p:clrMapOvr>
+    <a:masterClrMapping/>
+  </p:clrMapOvr>
+</p:sld>
+</file>
+
+<file path=ppt/slides/slide11.xml><?xml version="1.0" encoding="utf-8"?>
+<p:sld xmlns:a="http://schemas.openxmlformats.org/drawingml/2006/main" xmlns:r="http://schemas.openxmlformats.org/officeDocument/2006/relationships" xmlns:p="http://schemas.openxmlformats.org/presentationml/2006/main">
+  <p:cSld>
+    <p:spTree>
+      <p:nvGrpSpPr>
+        <p:cNvPr id="1" name=""/>
+        <p:cNvGrpSpPr/>
+        <p:nvPr/>
+      </p:nvGrpSpPr>
+      <p:grpSpPr>
+        <a:xfrm>
+          <a:off x="0" y="0"/>
+          <a:ext cx="0" cy="0"/>
+          <a:chOff x="0" y="0"/>
+          <a:chExt cx="0" cy="0"/>
+        </a:xfrm>
+      </p:grpSpPr>
+      <p:sp>
+        <p:nvSpPr>
+          <p:cNvPr id="2" name="Title 1">
+            <a:extLst>
+              <a:ext uri="{FF2B5EF4-FFF2-40B4-BE49-F238E27FC236}">
+                <a16:creationId xmlns:a16="http://schemas.microsoft.com/office/drawing/2014/main" id="{94B378F5-CB08-436A-8F23-0972B205A727}"/>
+              </a:ext>
+            </a:extLst>
+          </p:cNvPr>
+          <p:cNvSpPr>
+            <a:spLocks noGrp="1"/>
+          </p:cNvSpPr>
+          <p:nvPr>
+            <p:ph type="title"/>
+          </p:nvPr>
+        </p:nvSpPr>
+        <p:spPr/>
+        <p:txBody>
+          <a:bodyPr/>
+          <a:lstStyle/>
+          <a:p>
+            <a:r>
+              <a:rPr lang="en-US" dirty="0"/>
+              <a:t>Synthetic </a:t>
+            </a:r>
+            <a:r>
+              <a:rPr lang="el-GR" dirty="0">
+                <a:latin typeface="Cambria Math" panose="02040503050406030204" pitchFamily="18" charset="0"/>
+                <a:ea typeface="Cambria Math" panose="02040503050406030204" pitchFamily="18" charset="0"/>
+              </a:rPr>
+              <a:t>ρ</a:t>
+            </a:r>
+            <a:r>
+              <a:rPr lang="en-US" dirty="0">
+                <a:latin typeface="Cambria Math" panose="02040503050406030204" pitchFamily="18" charset="0"/>
+                <a:ea typeface="Cambria Math" panose="02040503050406030204" pitchFamily="18" charset="0"/>
+              </a:rPr>
+              <a:t>=0.0</a:t>
+            </a:r>
+            <a:endParaRPr lang="en-US" dirty="0"/>
+          </a:p>
+        </p:txBody>
+      </p:sp>
+      <mc:AlternateContent xmlns:mc="http://schemas.openxmlformats.org/markup-compatibility/2006">
+        <mc:Choice xmlns:a14="http://schemas.microsoft.com/office/drawing/2010/main" Requires="a14">
+          <p:sp>
+            <p:nvSpPr>
+              <p:cNvPr id="3" name="Content Placeholder 2">
+                <a:extLst>
+                  <a:ext uri="{FF2B5EF4-FFF2-40B4-BE49-F238E27FC236}">
+                    <a16:creationId xmlns:a16="http://schemas.microsoft.com/office/drawing/2014/main" id="{7B0B8F2F-10D7-4BB1-9DCB-602E9354C43F}"/>
+                  </a:ext>
+                </a:extLst>
+              </p:cNvPr>
+              <p:cNvSpPr>
+                <a:spLocks noGrp="1"/>
+              </p:cNvSpPr>
+              <p:nvPr>
+                <p:ph idx="1"/>
+              </p:nvPr>
+            </p:nvSpPr>
+            <p:spPr/>
+            <p:txBody>
+              <a:bodyPr/>
+              <a:lstStyle/>
+              <a:p>
+                <a:pPr marL="0" indent="0">
+                  <a:buNone/>
+                </a:pPr>
+                <a:r>
+                  <a:rPr lang="el-GR" dirty="0">
+                    <a:latin typeface="Cambria Math" panose="02040503050406030204" pitchFamily="18" charset="0"/>
+                    <a:ea typeface="Cambria Math" panose="02040503050406030204" pitchFamily="18" charset="0"/>
+                  </a:rPr>
+                  <a:t>ρ</a:t>
+                </a:r>
+                <a:r>
+                  <a:rPr lang="en-US" dirty="0">
+                    <a:latin typeface="Cambria Math" panose="02040503050406030204" pitchFamily="18" charset="0"/>
+                    <a:ea typeface="Cambria Math" panose="02040503050406030204" pitchFamily="18" charset="0"/>
+                  </a:rPr>
+                  <a:t>= beta ( </a:t>
+                </a:r>
+                <a:r>
+                  <a:rPr lang="el-GR" dirty="0">
+                    <a:latin typeface="Cambria Math" panose="02040503050406030204" pitchFamily="18" charset="0"/>
+                    <a:ea typeface="Cambria Math" panose="02040503050406030204" pitchFamily="18" charset="0"/>
+                  </a:rPr>
+                  <a:t>α</a:t>
+                </a:r>
+                <a:r>
+                  <a:rPr lang="en-US" dirty="0">
+                    <a:latin typeface="Cambria Math" panose="02040503050406030204" pitchFamily="18" charset="0"/>
+                    <a:ea typeface="Cambria Math" panose="02040503050406030204" pitchFamily="18" charset="0"/>
+                  </a:rPr>
+                  <a:t>=1, </a:t>
+                </a:r>
+                <a:r>
+                  <a:rPr lang="el-GR" dirty="0">
+                    <a:latin typeface="Cambria Math" panose="02040503050406030204" pitchFamily="18" charset="0"/>
+                    <a:ea typeface="Cambria Math" panose="02040503050406030204" pitchFamily="18" charset="0"/>
+                  </a:rPr>
+                  <a:t>β</a:t>
+                </a:r>
+                <a:r>
+                  <a:rPr lang="en-US" dirty="0">
+                    <a:latin typeface="Cambria Math" panose="02040503050406030204" pitchFamily="18" charset="0"/>
+                    <a:ea typeface="Cambria Math" panose="02040503050406030204" pitchFamily="18" charset="0"/>
+                  </a:rPr>
+                  <a:t>=5)</a:t>
+                </a:r>
+              </a:p>
+              <a:p>
+                <a:pPr marL="0" indent="0">
+                  <a:buNone/>
+                </a:pPr>
+                <a:r>
+                  <a:rPr lang="en-US" dirty="0">
+                    <a:latin typeface="Cambria Math" panose="02040503050406030204" pitchFamily="18" charset="0"/>
+                    <a:ea typeface="Cambria Math" panose="02040503050406030204" pitchFamily="18" charset="0"/>
+                  </a:rPr>
+                  <a:t>Mean = </a:t>
+                </a:r>
+                <a14:m>
+                  <m:oMath xmlns:m="http://schemas.openxmlformats.org/officeDocument/2006/math">
+                    <m:f>
+                      <m:fPr>
+                        <m:ctrlPr>
+                          <a:rPr lang="en-US" i="1" smtClean="0">
+                            <a:latin typeface="Cambria Math" panose="02040503050406030204" pitchFamily="18" charset="0"/>
+                            <a:ea typeface="Cambria Math" panose="02040503050406030204" pitchFamily="18" charset="0"/>
+                          </a:rPr>
+                        </m:ctrlPr>
+                      </m:fPr>
+                      <m:num>
+                        <m:r>
+                          <m:rPr>
+                            <m:nor/>
+                          </m:rPr>
+                          <a:rPr lang="el-GR" dirty="0">
+                            <a:latin typeface="Cambria Math" panose="02040503050406030204" pitchFamily="18" charset="0"/>
+                            <a:ea typeface="Cambria Math" panose="02040503050406030204" pitchFamily="18" charset="0"/>
+                          </a:rPr>
+                          <m:t>α</m:t>
+                        </m:r>
+                      </m:num>
+                      <m:den>
+                        <m:r>
+                          <m:rPr>
+                            <m:nor/>
+                          </m:rPr>
+                          <a:rPr lang="el-GR" dirty="0">
+                            <a:latin typeface="Cambria Math" panose="02040503050406030204" pitchFamily="18" charset="0"/>
+                            <a:ea typeface="Cambria Math" panose="02040503050406030204" pitchFamily="18" charset="0"/>
+                          </a:rPr>
+                          <m:t>α</m:t>
+                        </m:r>
+                        <m:r>
+                          <a:rPr lang="en-US" b="0" i="1" dirty="0" smtClean="0">
+                            <a:latin typeface="Cambria Math" panose="02040503050406030204" pitchFamily="18" charset="0"/>
+                            <a:ea typeface="Cambria Math" panose="02040503050406030204" pitchFamily="18" charset="0"/>
+                          </a:rPr>
+                          <m:t>+</m:t>
+                        </m:r>
+                        <m:r>
+                          <m:rPr>
+                            <m:nor/>
+                          </m:rPr>
+                          <a:rPr lang="el-GR" dirty="0">
+                            <a:latin typeface="Cambria Math" panose="02040503050406030204" pitchFamily="18" charset="0"/>
+                            <a:ea typeface="Cambria Math" panose="02040503050406030204" pitchFamily="18" charset="0"/>
+                          </a:rPr>
+                          <m:t>β</m:t>
+                        </m:r>
+                      </m:den>
+                    </m:f>
+                    <m:r>
+                      <a:rPr lang="en-US" b="0" i="1" smtClean="0">
+                        <a:latin typeface="Cambria Math" panose="02040503050406030204" pitchFamily="18" charset="0"/>
+                        <a:ea typeface="Cambria Math" panose="02040503050406030204" pitchFamily="18" charset="0"/>
+                      </a:rPr>
+                      <m:t>=</m:t>
+                    </m:r>
+                    <m:f>
+                      <m:fPr>
+                        <m:ctrlPr>
+                          <a:rPr lang="en-US" b="0" i="1" smtClean="0">
+                            <a:latin typeface="Cambria Math" panose="02040503050406030204" pitchFamily="18" charset="0"/>
+                            <a:ea typeface="Cambria Math" panose="02040503050406030204" pitchFamily="18" charset="0"/>
+                          </a:rPr>
+                        </m:ctrlPr>
+                      </m:fPr>
+                      <m:num>
+                        <m:r>
+                          <a:rPr lang="en-US" b="0" i="1" smtClean="0">
+                            <a:latin typeface="Cambria Math" panose="02040503050406030204" pitchFamily="18" charset="0"/>
+                            <a:ea typeface="Cambria Math" panose="02040503050406030204" pitchFamily="18" charset="0"/>
+                          </a:rPr>
+                          <m:t>1</m:t>
+                        </m:r>
+                      </m:num>
+                      <m:den>
+                        <m:r>
+                          <a:rPr lang="en-US" b="0" i="1" smtClean="0">
+                            <a:latin typeface="Cambria Math" panose="02040503050406030204" pitchFamily="18" charset="0"/>
+                            <a:ea typeface="Cambria Math" panose="02040503050406030204" pitchFamily="18" charset="0"/>
+                          </a:rPr>
+                          <m:t>6</m:t>
+                        </m:r>
+                      </m:den>
+                    </m:f>
+                  </m:oMath>
+                </a14:m>
+                <a:endParaRPr lang="en-US" dirty="0"/>
+              </a:p>
+              <a:p>
+                <a:pPr marL="0" indent="0">
+                  <a:buNone/>
+                </a:pPr>
+                <a:endParaRPr lang="en-US" dirty="0"/>
+              </a:p>
+              <a:p>
+                <a:pPr marL="0" indent="0">
+                  <a:buNone/>
+                </a:pPr>
+                <a:r>
+                  <a:rPr lang="en-US" dirty="0">
+                    <a:highlight>
+                      <a:srgbClr val="FFFF00"/>
+                    </a:highlight>
+                  </a:rPr>
+                  <a:t>Estimation</a:t>
+                </a:r>
+                <a:r>
+                  <a:rPr lang="en-US" dirty="0"/>
+                  <a:t> </a:t>
+                </a:r>
+              </a:p>
+              <a:p>
+                <a:pPr marL="0" indent="0">
+                  <a:buNone/>
+                </a:pPr>
+                <a:r>
+                  <a:rPr lang="en-US" dirty="0"/>
+                  <a:t>RHO </a:t>
+                </a:r>
+                <a:r>
+                  <a:rPr lang="en-US" dirty="0" err="1"/>
+                  <a:t>cov</a:t>
+                </a:r>
+                <a:r>
+                  <a:rPr lang="en-US" dirty="0"/>
+                  <a:t> info: mean=0.11 - </a:t>
+                </a:r>
+                <a:r>
+                  <a:rPr lang="en-US" dirty="0" err="1"/>
+                  <a:t>sd</a:t>
+                </a:r>
+                <a:r>
+                  <a:rPr lang="en-US" dirty="0"/>
+                  <a:t>=0.07</a:t>
+                </a:r>
+              </a:p>
+              <a:p>
+                <a:pPr marL="0" indent="0">
+                  <a:buNone/>
+                </a:pPr>
+                <a:r>
+                  <a:rPr lang="en-US" dirty="0"/>
+                  <a:t>SD </a:t>
+                </a:r>
+                <a:r>
+                  <a:rPr lang="en-US" dirty="0" err="1"/>
+                  <a:t>cov</a:t>
+                </a:r>
+                <a:r>
+                  <a:rPr lang="en-US" dirty="0"/>
+                  <a:t> info: mean=1.14 - </a:t>
+                </a:r>
+                <a:r>
+                  <a:rPr lang="en-US" dirty="0" err="1"/>
+                  <a:t>sd</a:t>
+                </a:r>
+                <a:r>
+                  <a:rPr lang="en-US" dirty="0"/>
+                  <a:t>=0.07</a:t>
+                </a:r>
+              </a:p>
+            </p:txBody>
+          </p:sp>
+        </mc:Choice>
+        <mc:Fallback>
+          <p:sp>
+            <p:nvSpPr>
+              <p:cNvPr id="3" name="Content Placeholder 2">
+                <a:extLst>
+                  <a:ext uri="{FF2B5EF4-FFF2-40B4-BE49-F238E27FC236}">
+                    <a16:creationId xmlns:a16="http://schemas.microsoft.com/office/drawing/2014/main" id="{7B0B8F2F-10D7-4BB1-9DCB-602E9354C43F}"/>
+                  </a:ext>
+                </a:extLst>
+              </p:cNvPr>
+              <p:cNvSpPr>
+                <a:spLocks noGrp="1" noRot="1" noChangeAspect="1" noMove="1" noResize="1" noEditPoints="1" noAdjustHandles="1" noChangeArrowheads="1" noChangeShapeType="1" noTextEdit="1"/>
+              </p:cNvSpPr>
+              <p:nvPr>
+                <p:ph idx="1"/>
+              </p:nvPr>
+            </p:nvSpPr>
+            <p:spPr>
+              <a:blipFill>
+                <a:blip r:embed="rId2"/>
+                <a:stretch>
+                  <a:fillRect l="-1217" t="-2381"/>
+                </a:stretch>
+              </a:blipFill>
+            </p:spPr>
+            <p:txBody>
+              <a:bodyPr/>
+              <a:lstStyle/>
+              <a:p>
+                <a:r>
+                  <a:rPr lang="en-US">
+                    <a:noFill/>
+                  </a:rPr>
+                  <a:t> </a:t>
+                </a:r>
+              </a:p>
+            </p:txBody>
+          </p:sp>
+        </mc:Fallback>
+      </mc:AlternateContent>
+      <p:pic>
+        <p:nvPicPr>
+          <p:cNvPr id="5" name="Picture 4">
+            <a:extLst>
+              <a:ext uri="{FF2B5EF4-FFF2-40B4-BE49-F238E27FC236}">
+                <a16:creationId xmlns:a16="http://schemas.microsoft.com/office/drawing/2014/main" id="{BA546176-B1B2-40A0-A998-0F872E64ADD1}"/>
+              </a:ext>
+            </a:extLst>
+          </p:cNvPr>
+          <p:cNvPicPr>
+            <a:picLocks noChangeAspect="1"/>
+          </p:cNvPicPr>
+          <p:nvPr/>
+        </p:nvPicPr>
+        <p:blipFill>
+          <a:blip r:embed="rId3"/>
+          <a:stretch>
+            <a:fillRect/>
+          </a:stretch>
+        </p:blipFill>
+        <p:spPr>
+          <a:xfrm>
+            <a:off x="7057503" y="2614546"/>
+            <a:ext cx="4800000" cy="3352381"/>
+          </a:xfrm>
+          <a:prstGeom prst="rect">
+            <a:avLst/>
+          </a:prstGeom>
+        </p:spPr>
+      </p:pic>
+    </p:spTree>
+    <p:extLst>
+      <p:ext uri="{BB962C8B-B14F-4D97-AF65-F5344CB8AC3E}">
+        <p14:creationId xmlns:p14="http://schemas.microsoft.com/office/powerpoint/2010/main" val="2677609294"/>
+      </p:ext>
+    </p:extLst>
+  </p:cSld>
+  <p:clrMapOvr>
+    <a:masterClrMapping/>
+  </p:clrMapOvr>
+</p:sld>
+</file>
+
+<file path=ppt/slides/slide12.xml><?xml version="1.0" encoding="utf-8"?>
+<p:sld xmlns:a="http://schemas.openxmlformats.org/drawingml/2006/main" xmlns:r="http://schemas.openxmlformats.org/officeDocument/2006/relationships" xmlns:p="http://schemas.openxmlformats.org/presentationml/2006/main">
+  <p:cSld>
+    <p:spTree>
+      <p:nvGrpSpPr>
+        <p:cNvPr id="1" name=""/>
+        <p:cNvGrpSpPr/>
+        <p:nvPr/>
+      </p:nvGrpSpPr>
+      <p:grpSpPr>
+        <a:xfrm>
+          <a:off x="0" y="0"/>
+          <a:ext cx="0" cy="0"/>
+          <a:chOff x="0" y="0"/>
+          <a:chExt cx="0" cy="0"/>
+        </a:xfrm>
+      </p:grpSpPr>
+      <p:sp>
+        <p:nvSpPr>
+          <p:cNvPr id="2" name="Title 1">
+            <a:extLst>
+              <a:ext uri="{FF2B5EF4-FFF2-40B4-BE49-F238E27FC236}">
+                <a16:creationId xmlns:a16="http://schemas.microsoft.com/office/drawing/2014/main" id="{94B378F5-CB08-436A-8F23-0972B205A727}"/>
+              </a:ext>
+            </a:extLst>
+          </p:cNvPr>
+          <p:cNvSpPr>
+            <a:spLocks noGrp="1"/>
+          </p:cNvSpPr>
+          <p:nvPr>
+            <p:ph type="title"/>
+          </p:nvPr>
+        </p:nvSpPr>
+        <p:spPr/>
+        <p:txBody>
+          <a:bodyPr/>
+          <a:lstStyle/>
+          <a:p>
+            <a:r>
+              <a:rPr lang="en-US" dirty="0"/>
+              <a:t>Synthetic </a:t>
+            </a:r>
+            <a:r>
+              <a:rPr lang="el-GR" dirty="0">
+                <a:latin typeface="Cambria Math" panose="02040503050406030204" pitchFamily="18" charset="0"/>
+                <a:ea typeface="Cambria Math" panose="02040503050406030204" pitchFamily="18" charset="0"/>
+              </a:rPr>
+              <a:t>ρ</a:t>
+            </a:r>
+            <a:r>
+              <a:rPr lang="en-US" dirty="0">
+                <a:latin typeface="Cambria Math" panose="02040503050406030204" pitchFamily="18" charset="0"/>
+                <a:ea typeface="Cambria Math" panose="02040503050406030204" pitchFamily="18" charset="0"/>
+              </a:rPr>
+              <a:t>=0.2</a:t>
+            </a:r>
+            <a:endParaRPr lang="en-US" dirty="0"/>
+          </a:p>
+        </p:txBody>
+      </p:sp>
+      <mc:AlternateContent xmlns:mc="http://schemas.openxmlformats.org/markup-compatibility/2006">
+        <mc:Choice xmlns:a14="http://schemas.microsoft.com/office/drawing/2010/main" Requires="a14">
+          <p:sp>
+            <p:nvSpPr>
+              <p:cNvPr id="3" name="Content Placeholder 2">
+                <a:extLst>
+                  <a:ext uri="{FF2B5EF4-FFF2-40B4-BE49-F238E27FC236}">
+                    <a16:creationId xmlns:a16="http://schemas.microsoft.com/office/drawing/2014/main" id="{7B0B8F2F-10D7-4BB1-9DCB-602E9354C43F}"/>
+                  </a:ext>
+                </a:extLst>
+              </p:cNvPr>
+              <p:cNvSpPr>
+                <a:spLocks noGrp="1"/>
+              </p:cNvSpPr>
+              <p:nvPr>
+                <p:ph idx="1"/>
+              </p:nvPr>
+            </p:nvSpPr>
+            <p:spPr/>
+            <p:txBody>
+              <a:bodyPr/>
+              <a:lstStyle/>
+              <a:p>
+                <a:pPr marL="0" indent="0">
+                  <a:buNone/>
+                </a:pPr>
+                <a:r>
+                  <a:rPr lang="el-GR" dirty="0">
+                    <a:latin typeface="Cambria Math" panose="02040503050406030204" pitchFamily="18" charset="0"/>
+                    <a:ea typeface="Cambria Math" panose="02040503050406030204" pitchFamily="18" charset="0"/>
+                  </a:rPr>
+                  <a:t>ρ</a:t>
+                </a:r>
+                <a:r>
+                  <a:rPr lang="en-US" dirty="0">
+                    <a:latin typeface="Cambria Math" panose="02040503050406030204" pitchFamily="18" charset="0"/>
+                    <a:ea typeface="Cambria Math" panose="02040503050406030204" pitchFamily="18" charset="0"/>
+                  </a:rPr>
+                  <a:t>= beta ( </a:t>
+                </a:r>
+                <a:r>
+                  <a:rPr lang="el-GR" dirty="0">
+                    <a:latin typeface="Cambria Math" panose="02040503050406030204" pitchFamily="18" charset="0"/>
+                    <a:ea typeface="Cambria Math" panose="02040503050406030204" pitchFamily="18" charset="0"/>
+                  </a:rPr>
+                  <a:t>α</a:t>
+                </a:r>
+                <a:r>
+                  <a:rPr lang="en-US" dirty="0">
+                    <a:latin typeface="Cambria Math" panose="02040503050406030204" pitchFamily="18" charset="0"/>
+                    <a:ea typeface="Cambria Math" panose="02040503050406030204" pitchFamily="18" charset="0"/>
+                  </a:rPr>
+                  <a:t>=1, </a:t>
+                </a:r>
+                <a:r>
+                  <a:rPr lang="el-GR" dirty="0">
+                    <a:latin typeface="Cambria Math" panose="02040503050406030204" pitchFamily="18" charset="0"/>
+                    <a:ea typeface="Cambria Math" panose="02040503050406030204" pitchFamily="18" charset="0"/>
+                  </a:rPr>
+                  <a:t>β</a:t>
+                </a:r>
+                <a:r>
+                  <a:rPr lang="en-US" dirty="0">
+                    <a:latin typeface="Cambria Math" panose="02040503050406030204" pitchFamily="18" charset="0"/>
+                    <a:ea typeface="Cambria Math" panose="02040503050406030204" pitchFamily="18" charset="0"/>
+                  </a:rPr>
+                  <a:t>=5)</a:t>
+                </a:r>
+              </a:p>
+              <a:p>
+                <a:pPr marL="0" indent="0">
+                  <a:buNone/>
+                </a:pPr>
+                <a:r>
+                  <a:rPr lang="en-US" dirty="0">
+                    <a:latin typeface="Cambria Math" panose="02040503050406030204" pitchFamily="18" charset="0"/>
+                    <a:ea typeface="Cambria Math" panose="02040503050406030204" pitchFamily="18" charset="0"/>
+                  </a:rPr>
+                  <a:t>Mean = </a:t>
+                </a:r>
+                <a14:m>
+                  <m:oMath xmlns:m="http://schemas.openxmlformats.org/officeDocument/2006/math">
+                    <m:f>
+                      <m:fPr>
+                        <m:ctrlPr>
+                          <a:rPr lang="en-US" i="1" smtClean="0">
+                            <a:latin typeface="Cambria Math" panose="02040503050406030204" pitchFamily="18" charset="0"/>
+                            <a:ea typeface="Cambria Math" panose="02040503050406030204" pitchFamily="18" charset="0"/>
+                          </a:rPr>
+                        </m:ctrlPr>
+                      </m:fPr>
+                      <m:num>
+                        <m:r>
+                          <m:rPr>
+                            <m:nor/>
+                          </m:rPr>
+                          <a:rPr lang="el-GR" dirty="0">
+                            <a:latin typeface="Cambria Math" panose="02040503050406030204" pitchFamily="18" charset="0"/>
+                            <a:ea typeface="Cambria Math" panose="02040503050406030204" pitchFamily="18" charset="0"/>
+                          </a:rPr>
+                          <m:t>α</m:t>
+                        </m:r>
+                      </m:num>
+                      <m:den>
+                        <m:r>
+                          <m:rPr>
+                            <m:nor/>
+                          </m:rPr>
+                          <a:rPr lang="el-GR" dirty="0">
+                            <a:latin typeface="Cambria Math" panose="02040503050406030204" pitchFamily="18" charset="0"/>
+                            <a:ea typeface="Cambria Math" panose="02040503050406030204" pitchFamily="18" charset="0"/>
+                          </a:rPr>
+                          <m:t>α</m:t>
+                        </m:r>
+                        <m:r>
+                          <a:rPr lang="en-US" b="0" i="1" dirty="0" smtClean="0">
+                            <a:latin typeface="Cambria Math" panose="02040503050406030204" pitchFamily="18" charset="0"/>
+                            <a:ea typeface="Cambria Math" panose="02040503050406030204" pitchFamily="18" charset="0"/>
+                          </a:rPr>
+                          <m:t>+</m:t>
+                        </m:r>
+                        <m:r>
+                          <m:rPr>
+                            <m:nor/>
+                          </m:rPr>
+                          <a:rPr lang="el-GR" dirty="0">
+                            <a:latin typeface="Cambria Math" panose="02040503050406030204" pitchFamily="18" charset="0"/>
+                            <a:ea typeface="Cambria Math" panose="02040503050406030204" pitchFamily="18" charset="0"/>
+                          </a:rPr>
+                          <m:t>β</m:t>
+                        </m:r>
+                      </m:den>
+                    </m:f>
+                    <m:r>
+                      <a:rPr lang="en-US" b="0" i="1" smtClean="0">
+                        <a:latin typeface="Cambria Math" panose="02040503050406030204" pitchFamily="18" charset="0"/>
+                        <a:ea typeface="Cambria Math" panose="02040503050406030204" pitchFamily="18" charset="0"/>
+                      </a:rPr>
+                      <m:t>=</m:t>
+                    </m:r>
+                    <m:f>
+                      <m:fPr>
+                        <m:ctrlPr>
+                          <a:rPr lang="en-US" b="0" i="1" smtClean="0">
+                            <a:latin typeface="Cambria Math" panose="02040503050406030204" pitchFamily="18" charset="0"/>
+                            <a:ea typeface="Cambria Math" panose="02040503050406030204" pitchFamily="18" charset="0"/>
+                          </a:rPr>
+                        </m:ctrlPr>
+                      </m:fPr>
+                      <m:num>
+                        <m:r>
+                          <a:rPr lang="en-US" b="0" i="1" smtClean="0">
+                            <a:latin typeface="Cambria Math" panose="02040503050406030204" pitchFamily="18" charset="0"/>
+                            <a:ea typeface="Cambria Math" panose="02040503050406030204" pitchFamily="18" charset="0"/>
+                          </a:rPr>
+                          <m:t>1</m:t>
+                        </m:r>
+                      </m:num>
+                      <m:den>
+                        <m:r>
+                          <a:rPr lang="en-US" b="0" i="1" smtClean="0">
+                            <a:latin typeface="Cambria Math" panose="02040503050406030204" pitchFamily="18" charset="0"/>
+                            <a:ea typeface="Cambria Math" panose="02040503050406030204" pitchFamily="18" charset="0"/>
+                          </a:rPr>
+                          <m:t>6</m:t>
+                        </m:r>
+                      </m:den>
+                    </m:f>
+                  </m:oMath>
+                </a14:m>
+                <a:endParaRPr lang="en-US" dirty="0"/>
+              </a:p>
+              <a:p>
+                <a:pPr marL="0" indent="0">
+                  <a:buNone/>
+                </a:pPr>
+                <a:endParaRPr lang="en-US" dirty="0"/>
+              </a:p>
+              <a:p>
+                <a:pPr marL="0" indent="0">
+                  <a:buNone/>
+                </a:pPr>
+                <a:r>
+                  <a:rPr lang="en-US" dirty="0">
+                    <a:highlight>
+                      <a:srgbClr val="FFFF00"/>
+                    </a:highlight>
+                  </a:rPr>
+                  <a:t>Estimation</a:t>
+                </a:r>
+                <a:r>
+                  <a:rPr lang="en-US" dirty="0"/>
+                  <a:t> </a:t>
+                </a:r>
+              </a:p>
+              <a:p>
+                <a:pPr marL="0" indent="0">
+                  <a:buNone/>
+                </a:pPr>
+                <a:r>
+                  <a:rPr lang="en-US" dirty="0"/>
+                  <a:t>RHO </a:t>
+                </a:r>
+                <a:r>
+                  <a:rPr lang="en-US" dirty="0" err="1"/>
+                  <a:t>cov</a:t>
+                </a:r>
+                <a:r>
+                  <a:rPr lang="en-US" dirty="0"/>
+                  <a:t> info: mean=0.11 - </a:t>
+                </a:r>
+                <a:r>
+                  <a:rPr lang="en-US" dirty="0" err="1"/>
+                  <a:t>sd</a:t>
+                </a:r>
+                <a:r>
+                  <a:rPr lang="en-US" dirty="0"/>
+                  <a:t>=0.03</a:t>
+                </a:r>
+              </a:p>
+              <a:p>
+                <a:pPr marL="0" indent="0">
+                  <a:buNone/>
+                </a:pPr>
+                <a:r>
+                  <a:rPr lang="en-US" dirty="0"/>
+                  <a:t>SD </a:t>
+                </a:r>
+                <a:r>
+                  <a:rPr lang="en-US" dirty="0" err="1"/>
+                  <a:t>cov</a:t>
+                </a:r>
+                <a:r>
+                  <a:rPr lang="en-US" dirty="0"/>
+                  <a:t> info: mean=1.21 - </a:t>
+                </a:r>
+                <a:r>
+                  <a:rPr lang="en-US" dirty="0" err="1"/>
+                  <a:t>sd</a:t>
+                </a:r>
+                <a:r>
+                  <a:rPr lang="en-US" dirty="0"/>
+                  <a:t>=0.05</a:t>
+                </a:r>
+              </a:p>
+            </p:txBody>
+          </p:sp>
+        </mc:Choice>
+        <mc:Fallback>
+          <p:sp>
+            <p:nvSpPr>
+              <p:cNvPr id="3" name="Content Placeholder 2">
+                <a:extLst>
+                  <a:ext uri="{FF2B5EF4-FFF2-40B4-BE49-F238E27FC236}">
+                    <a16:creationId xmlns:a16="http://schemas.microsoft.com/office/drawing/2014/main" id="{7B0B8F2F-10D7-4BB1-9DCB-602E9354C43F}"/>
+                  </a:ext>
+                </a:extLst>
+              </p:cNvPr>
+              <p:cNvSpPr>
+                <a:spLocks noGrp="1" noRot="1" noChangeAspect="1" noMove="1" noResize="1" noEditPoints="1" noAdjustHandles="1" noChangeArrowheads="1" noChangeShapeType="1" noTextEdit="1"/>
+              </p:cNvSpPr>
+              <p:nvPr>
+                <p:ph idx="1"/>
+              </p:nvPr>
+            </p:nvSpPr>
+            <p:spPr>
+              <a:blipFill>
+                <a:blip r:embed="rId2"/>
+                <a:stretch>
+                  <a:fillRect l="-1217" t="-2381"/>
+                </a:stretch>
+              </a:blipFill>
+            </p:spPr>
+            <p:txBody>
+              <a:bodyPr/>
+              <a:lstStyle/>
+              <a:p>
+                <a:r>
+                  <a:rPr lang="en-US">
+                    <a:noFill/>
+                  </a:rPr>
+                  <a:t> </a:t>
+                </a:r>
+              </a:p>
+            </p:txBody>
+          </p:sp>
+        </mc:Fallback>
+      </mc:AlternateContent>
+      <p:pic>
+        <p:nvPicPr>
+          <p:cNvPr id="6" name="Picture 5">
+            <a:extLst>
+              <a:ext uri="{FF2B5EF4-FFF2-40B4-BE49-F238E27FC236}">
+                <a16:creationId xmlns:a16="http://schemas.microsoft.com/office/drawing/2014/main" id="{47AF8834-69AB-44D6-B19C-F2B79BD65090}"/>
+              </a:ext>
+            </a:extLst>
+          </p:cNvPr>
+          <p:cNvPicPr>
+            <a:picLocks noChangeAspect="1"/>
+          </p:cNvPicPr>
+          <p:nvPr/>
+        </p:nvPicPr>
+        <p:blipFill>
+          <a:blip r:embed="rId3"/>
+          <a:stretch>
+            <a:fillRect/>
+          </a:stretch>
+        </p:blipFill>
+        <p:spPr>
+          <a:xfrm>
+            <a:off x="5900257" y="1604963"/>
+            <a:ext cx="6096000" cy="4572000"/>
+          </a:xfrm>
+          <a:prstGeom prst="rect">
+            <a:avLst/>
+          </a:prstGeom>
+        </p:spPr>
+      </p:pic>
+    </p:spTree>
+    <p:extLst>
+      <p:ext uri="{BB962C8B-B14F-4D97-AF65-F5344CB8AC3E}">
+        <p14:creationId xmlns:p14="http://schemas.microsoft.com/office/powerpoint/2010/main" val="1053905848"/>
+      </p:ext>
+    </p:extLst>
+  </p:cSld>
+  <p:clrMapOvr>
+    <a:masterClrMapping/>
+  </p:clrMapOvr>
+</p:sld>
+</file>
+
+<file path=ppt/slides/slide13.xml><?xml version="1.0" encoding="utf-8"?>
+<p:sld xmlns:a="http://schemas.openxmlformats.org/drawingml/2006/main" xmlns:r="http://schemas.openxmlformats.org/officeDocument/2006/relationships" xmlns:p="http://schemas.openxmlformats.org/presentationml/2006/main">
+  <p:cSld>
+    <p:spTree>
+      <p:nvGrpSpPr>
+        <p:cNvPr id="1" name=""/>
+        <p:cNvGrpSpPr/>
+        <p:nvPr/>
+      </p:nvGrpSpPr>
+      <p:grpSpPr>
+        <a:xfrm>
+          <a:off x="0" y="0"/>
+          <a:ext cx="0" cy="0"/>
+          <a:chOff x="0" y="0"/>
+          <a:chExt cx="0" cy="0"/>
+        </a:xfrm>
+      </p:grpSpPr>
+      <p:sp>
+        <p:nvSpPr>
+          <p:cNvPr id="2" name="Title 1">
+            <a:extLst>
+              <a:ext uri="{FF2B5EF4-FFF2-40B4-BE49-F238E27FC236}">
+                <a16:creationId xmlns:a16="http://schemas.microsoft.com/office/drawing/2014/main" id="{CCBBFE0B-FB2B-4D56-953D-CF2B45A5FD5F}"/>
+              </a:ext>
+            </a:extLst>
+          </p:cNvPr>
+          <p:cNvSpPr>
+            <a:spLocks noGrp="1"/>
+          </p:cNvSpPr>
+          <p:nvPr>
+            <p:ph type="title"/>
+          </p:nvPr>
+        </p:nvSpPr>
+        <p:spPr/>
+        <p:txBody>
+          <a:bodyPr/>
+          <a:lstStyle/>
+          <a:p>
+            <a:r>
+              <a:rPr lang="en-US" dirty="0"/>
+              <a:t>Synthetic 0.0 </a:t>
+            </a:r>
+          </a:p>
+        </p:txBody>
+      </p:sp>
+      <mc:AlternateContent xmlns:mc="http://schemas.openxmlformats.org/markup-compatibility/2006">
+        <mc:Choice xmlns:a14="http://schemas.microsoft.com/office/drawing/2010/main" Requires="a14">
+          <p:sp>
+            <p:nvSpPr>
+              <p:cNvPr id="3" name="Content Placeholder 2">
+                <a:extLst>
+                  <a:ext uri="{FF2B5EF4-FFF2-40B4-BE49-F238E27FC236}">
+                    <a16:creationId xmlns:a16="http://schemas.microsoft.com/office/drawing/2014/main" id="{ADCE720B-ACA3-4266-910F-47D85CD0AB03}"/>
+                  </a:ext>
+                </a:extLst>
+              </p:cNvPr>
+              <p:cNvSpPr>
+                <a:spLocks noGrp="1"/>
+              </p:cNvSpPr>
+              <p:nvPr>
+                <p:ph idx="1"/>
+              </p:nvPr>
+            </p:nvSpPr>
+            <p:spPr/>
+            <p:txBody>
+              <a:bodyPr/>
+              <a:lstStyle/>
+              <a:p>
+                <a:pPr marL="0" indent="0">
+                  <a:buNone/>
+                </a:pPr>
+                <a:r>
+                  <a:rPr lang="el-GR" dirty="0">
+                    <a:latin typeface="Cambria Math" panose="02040503050406030204" pitchFamily="18" charset="0"/>
+                    <a:ea typeface="Cambria Math" panose="02040503050406030204" pitchFamily="18" charset="0"/>
+                  </a:rPr>
+                  <a:t>ρ</a:t>
+                </a:r>
+                <a:r>
+                  <a:rPr lang="en-US" dirty="0">
+                    <a:latin typeface="Cambria Math" panose="02040503050406030204" pitchFamily="18" charset="0"/>
+                    <a:ea typeface="Cambria Math" panose="02040503050406030204" pitchFamily="18" charset="0"/>
+                  </a:rPr>
+                  <a:t>= beta ( </a:t>
+                </a:r>
+                <a:r>
+                  <a:rPr lang="el-GR" dirty="0">
+                    <a:latin typeface="Cambria Math" panose="02040503050406030204" pitchFamily="18" charset="0"/>
+                    <a:ea typeface="Cambria Math" panose="02040503050406030204" pitchFamily="18" charset="0"/>
+                  </a:rPr>
+                  <a:t>α</a:t>
+                </a:r>
+                <a:r>
+                  <a:rPr lang="en-US" dirty="0">
+                    <a:latin typeface="Cambria Math" panose="02040503050406030204" pitchFamily="18" charset="0"/>
+                    <a:ea typeface="Cambria Math" panose="02040503050406030204" pitchFamily="18" charset="0"/>
+                  </a:rPr>
+                  <a:t>=1, </a:t>
+                </a:r>
+                <a:r>
+                  <a:rPr lang="el-GR" dirty="0">
+                    <a:latin typeface="Cambria Math" panose="02040503050406030204" pitchFamily="18" charset="0"/>
+                    <a:ea typeface="Cambria Math" panose="02040503050406030204" pitchFamily="18" charset="0"/>
+                  </a:rPr>
+                  <a:t>β</a:t>
+                </a:r>
+                <a:r>
+                  <a:rPr lang="en-US" dirty="0">
+                    <a:latin typeface="Cambria Math" panose="02040503050406030204" pitchFamily="18" charset="0"/>
+                    <a:ea typeface="Cambria Math" panose="02040503050406030204" pitchFamily="18" charset="0"/>
+                  </a:rPr>
+                  <a:t>=10)  → Mean = </a:t>
+                </a:r>
+                <a14:m>
+                  <m:oMath xmlns:m="http://schemas.openxmlformats.org/officeDocument/2006/math">
+                    <m:f>
+                      <m:fPr>
+                        <m:ctrlPr>
+                          <a:rPr lang="en-US" i="1" smtClean="0">
+                            <a:latin typeface="Cambria Math" panose="02040503050406030204" pitchFamily="18" charset="0"/>
+                            <a:ea typeface="Cambria Math" panose="02040503050406030204" pitchFamily="18" charset="0"/>
+                          </a:rPr>
+                        </m:ctrlPr>
+                      </m:fPr>
+                      <m:num>
+                        <m:r>
+                          <m:rPr>
+                            <m:nor/>
+                          </m:rPr>
+                          <a:rPr lang="el-GR" dirty="0">
+                            <a:latin typeface="Cambria Math" panose="02040503050406030204" pitchFamily="18" charset="0"/>
+                            <a:ea typeface="Cambria Math" panose="02040503050406030204" pitchFamily="18" charset="0"/>
+                          </a:rPr>
+                          <m:t>α</m:t>
+                        </m:r>
+                      </m:num>
+                      <m:den>
+                        <m:r>
+                          <m:rPr>
+                            <m:nor/>
+                          </m:rPr>
+                          <a:rPr lang="el-GR" dirty="0">
+                            <a:latin typeface="Cambria Math" panose="02040503050406030204" pitchFamily="18" charset="0"/>
+                            <a:ea typeface="Cambria Math" panose="02040503050406030204" pitchFamily="18" charset="0"/>
+                          </a:rPr>
+                          <m:t>α</m:t>
+                        </m:r>
+                        <m:r>
+                          <a:rPr lang="en-US" b="0" i="1" dirty="0" smtClean="0">
+                            <a:latin typeface="Cambria Math" panose="02040503050406030204" pitchFamily="18" charset="0"/>
+                            <a:ea typeface="Cambria Math" panose="02040503050406030204" pitchFamily="18" charset="0"/>
+                          </a:rPr>
+                          <m:t>+</m:t>
+                        </m:r>
+                        <m:r>
+                          <m:rPr>
+                            <m:nor/>
+                          </m:rPr>
+                          <a:rPr lang="el-GR" dirty="0">
+                            <a:latin typeface="Cambria Math" panose="02040503050406030204" pitchFamily="18" charset="0"/>
+                            <a:ea typeface="Cambria Math" panose="02040503050406030204" pitchFamily="18" charset="0"/>
+                          </a:rPr>
+                          <m:t>β</m:t>
+                        </m:r>
+                      </m:den>
+                    </m:f>
+                    <m:r>
+                      <a:rPr lang="en-US" b="0" i="1" smtClean="0">
+                        <a:latin typeface="Cambria Math" panose="02040503050406030204" pitchFamily="18" charset="0"/>
+                        <a:ea typeface="Cambria Math" panose="02040503050406030204" pitchFamily="18" charset="0"/>
+                      </a:rPr>
+                      <m:t>=</m:t>
+                    </m:r>
+                    <m:f>
+                      <m:fPr>
+                        <m:ctrlPr>
+                          <a:rPr lang="en-US" b="0" i="1" smtClean="0">
+                            <a:latin typeface="Cambria Math" panose="02040503050406030204" pitchFamily="18" charset="0"/>
+                            <a:ea typeface="Cambria Math" panose="02040503050406030204" pitchFamily="18" charset="0"/>
+                          </a:rPr>
+                        </m:ctrlPr>
+                      </m:fPr>
+                      <m:num>
+                        <m:r>
+                          <a:rPr lang="en-US" b="0" i="1" smtClean="0">
+                            <a:latin typeface="Cambria Math" panose="02040503050406030204" pitchFamily="18" charset="0"/>
+                            <a:ea typeface="Cambria Math" panose="02040503050406030204" pitchFamily="18" charset="0"/>
+                          </a:rPr>
+                          <m:t>1</m:t>
+                        </m:r>
+                      </m:num>
+                      <m:den>
+                        <m:r>
+                          <a:rPr lang="en-US" b="0" i="1" smtClean="0">
+                            <a:latin typeface="Cambria Math" panose="02040503050406030204" pitchFamily="18" charset="0"/>
+                            <a:ea typeface="Cambria Math" panose="02040503050406030204" pitchFamily="18" charset="0"/>
+                          </a:rPr>
+                          <m:t>11</m:t>
+                        </m:r>
+                      </m:den>
+                    </m:f>
+                  </m:oMath>
+                </a14:m>
+                <a:endParaRPr lang="en-US" dirty="0"/>
+              </a:p>
+              <a:p>
+                <a:pPr marL="0" indent="0">
+                  <a:buNone/>
+                </a:pPr>
+                <a:r>
+                  <a:rPr lang="el-GR" dirty="0">
+                    <a:latin typeface="Cambria Math" panose="02040503050406030204" pitchFamily="18" charset="0"/>
+                    <a:ea typeface="Cambria Math" panose="02040503050406030204" pitchFamily="18" charset="0"/>
+                  </a:rPr>
+                  <a:t>σ</a:t>
+                </a:r>
+                <a:r>
+                  <a:rPr lang="en-US" dirty="0">
+                    <a:latin typeface="Cambria Math" panose="02040503050406030204" pitchFamily="18" charset="0"/>
+                    <a:ea typeface="Cambria Math" panose="02040503050406030204" pitchFamily="18" charset="0"/>
+                  </a:rPr>
+                  <a:t>= beta ( </a:t>
+                </a:r>
+                <a:r>
+                  <a:rPr lang="el-GR" dirty="0">
+                    <a:latin typeface="Cambria Math" panose="02040503050406030204" pitchFamily="18" charset="0"/>
+                    <a:ea typeface="Cambria Math" panose="02040503050406030204" pitchFamily="18" charset="0"/>
+                  </a:rPr>
+                  <a:t>α</a:t>
+                </a:r>
+                <a:r>
+                  <a:rPr lang="en-US" dirty="0">
+                    <a:latin typeface="Cambria Math" panose="02040503050406030204" pitchFamily="18" charset="0"/>
+                    <a:ea typeface="Cambria Math" panose="02040503050406030204" pitchFamily="18" charset="0"/>
+                  </a:rPr>
+                  <a:t>=2, </a:t>
+                </a:r>
+                <a:r>
+                  <a:rPr lang="el-GR" dirty="0">
+                    <a:latin typeface="Cambria Math" panose="02040503050406030204" pitchFamily="18" charset="0"/>
+                    <a:ea typeface="Cambria Math" panose="02040503050406030204" pitchFamily="18" charset="0"/>
+                  </a:rPr>
+                  <a:t>β</a:t>
+                </a:r>
+                <a:r>
+                  <a:rPr lang="en-US" dirty="0">
+                    <a:latin typeface="Cambria Math" panose="02040503050406030204" pitchFamily="18" charset="0"/>
+                    <a:ea typeface="Cambria Math" panose="02040503050406030204" pitchFamily="18" charset="0"/>
+                  </a:rPr>
+                  <a:t>=1)  → Mean = </a:t>
+                </a:r>
+                <a14:m>
+                  <m:oMath xmlns:m="http://schemas.openxmlformats.org/officeDocument/2006/math">
+                    <m:f>
+                      <m:fPr>
+                        <m:ctrlPr>
+                          <a:rPr lang="en-US" i="1" smtClean="0">
+                            <a:latin typeface="Cambria Math" panose="02040503050406030204" pitchFamily="18" charset="0"/>
+                            <a:ea typeface="Cambria Math" panose="02040503050406030204" pitchFamily="18" charset="0"/>
+                          </a:rPr>
+                        </m:ctrlPr>
+                      </m:fPr>
+                      <m:num>
+                        <m:r>
+                          <m:rPr>
+                            <m:nor/>
+                          </m:rPr>
+                          <a:rPr lang="el-GR" dirty="0">
+                            <a:latin typeface="Cambria Math" panose="02040503050406030204" pitchFamily="18" charset="0"/>
+                            <a:ea typeface="Cambria Math" panose="02040503050406030204" pitchFamily="18" charset="0"/>
+                          </a:rPr>
+                          <m:t>β</m:t>
+                        </m:r>
+                      </m:num>
+                      <m:den>
+                        <m:r>
+                          <m:rPr>
+                            <m:nor/>
+                          </m:rPr>
+                          <a:rPr lang="el-GR" dirty="0">
+                            <a:latin typeface="Cambria Math" panose="02040503050406030204" pitchFamily="18" charset="0"/>
+                            <a:ea typeface="Cambria Math" panose="02040503050406030204" pitchFamily="18" charset="0"/>
+                          </a:rPr>
+                          <m:t>α</m:t>
+                        </m:r>
+                        <m:r>
+                          <a:rPr lang="en-US" b="0" i="1" dirty="0" smtClean="0">
+                            <a:latin typeface="Cambria Math" panose="02040503050406030204" pitchFamily="18" charset="0"/>
+                            <a:ea typeface="Cambria Math" panose="02040503050406030204" pitchFamily="18" charset="0"/>
+                          </a:rPr>
+                          <m:t>−1</m:t>
+                        </m:r>
+                      </m:den>
+                    </m:f>
+                    <m:r>
+                      <a:rPr lang="en-US" b="0" i="1" smtClean="0">
+                        <a:latin typeface="Cambria Math" panose="02040503050406030204" pitchFamily="18" charset="0"/>
+                        <a:ea typeface="Cambria Math" panose="02040503050406030204" pitchFamily="18" charset="0"/>
+                      </a:rPr>
+                      <m:t>=</m:t>
+                    </m:r>
+                    <m:f>
+                      <m:fPr>
+                        <m:ctrlPr>
+                          <a:rPr lang="en-US" b="0" i="1" smtClean="0">
+                            <a:latin typeface="Cambria Math" panose="02040503050406030204" pitchFamily="18" charset="0"/>
+                            <a:ea typeface="Cambria Math" panose="02040503050406030204" pitchFamily="18" charset="0"/>
+                          </a:rPr>
+                        </m:ctrlPr>
+                      </m:fPr>
+                      <m:num>
+                        <m:r>
+                          <a:rPr lang="en-US" b="0" i="1" smtClean="0">
+                            <a:latin typeface="Cambria Math" panose="02040503050406030204" pitchFamily="18" charset="0"/>
+                            <a:ea typeface="Cambria Math" panose="02040503050406030204" pitchFamily="18" charset="0"/>
+                          </a:rPr>
+                          <m:t>1</m:t>
+                        </m:r>
+                      </m:num>
+                      <m:den>
+                        <m:r>
+                          <a:rPr lang="en-US" b="0" i="1" smtClean="0">
+                            <a:latin typeface="Cambria Math" panose="02040503050406030204" pitchFamily="18" charset="0"/>
+                            <a:ea typeface="Cambria Math" panose="02040503050406030204" pitchFamily="18" charset="0"/>
+                          </a:rPr>
+                          <m:t>1</m:t>
+                        </m:r>
+                      </m:den>
+                    </m:f>
+                    <m:r>
+                      <a:rPr lang="en-US" b="0" i="1" smtClean="0">
+                        <a:latin typeface="Cambria Math" panose="02040503050406030204" pitchFamily="18" charset="0"/>
+                        <a:ea typeface="Cambria Math" panose="02040503050406030204" pitchFamily="18" charset="0"/>
+                      </a:rPr>
+                      <m:t>=1</m:t>
+                    </m:r>
+                  </m:oMath>
+                </a14:m>
+                <a:endParaRPr lang="en-US" dirty="0"/>
+              </a:p>
+              <a:p>
+                <a:pPr marL="0" indent="0">
+                  <a:buNone/>
+                </a:pPr>
+                <a:endParaRPr lang="en-US" dirty="0"/>
+              </a:p>
+            </p:txBody>
+          </p:sp>
+        </mc:Choice>
+        <mc:Fallback>
+          <p:sp>
+            <p:nvSpPr>
+              <p:cNvPr id="3" name="Content Placeholder 2">
+                <a:extLst>
+                  <a:ext uri="{FF2B5EF4-FFF2-40B4-BE49-F238E27FC236}">
+                    <a16:creationId xmlns:a16="http://schemas.microsoft.com/office/drawing/2014/main" id="{ADCE720B-ACA3-4266-910F-47D85CD0AB03}"/>
+                  </a:ext>
+                </a:extLst>
+              </p:cNvPr>
+              <p:cNvSpPr>
+                <a:spLocks noGrp="1" noRot="1" noChangeAspect="1" noMove="1" noResize="1" noEditPoints="1" noAdjustHandles="1" noChangeArrowheads="1" noChangeShapeType="1" noTextEdit="1"/>
+              </p:cNvSpPr>
+              <p:nvPr>
+                <p:ph idx="1"/>
+              </p:nvPr>
+            </p:nvSpPr>
+            <p:spPr>
+              <a:blipFill>
+                <a:blip r:embed="rId2"/>
+                <a:stretch>
+                  <a:fillRect l="-1217" t="-700"/>
+                </a:stretch>
+              </a:blipFill>
+            </p:spPr>
+            <p:txBody>
+              <a:bodyPr/>
+              <a:lstStyle/>
+              <a:p>
+                <a:r>
+                  <a:rPr lang="en-US">
+                    <a:noFill/>
+                  </a:rPr>
+                  <a:t> </a:t>
+                </a:r>
+              </a:p>
+            </p:txBody>
+          </p:sp>
+        </mc:Fallback>
+      </mc:AlternateContent>
+      <p:pic>
+        <p:nvPicPr>
+          <p:cNvPr id="5" name="Picture 4">
+            <a:extLst>
+              <a:ext uri="{FF2B5EF4-FFF2-40B4-BE49-F238E27FC236}">
+                <a16:creationId xmlns:a16="http://schemas.microsoft.com/office/drawing/2014/main" id="{DF94AFCE-DC30-48FD-9163-7595E5C301E7}"/>
+              </a:ext>
+            </a:extLst>
+          </p:cNvPr>
+          <p:cNvPicPr>
+            <a:picLocks noChangeAspect="1"/>
+          </p:cNvPicPr>
+          <p:nvPr/>
+        </p:nvPicPr>
+        <p:blipFill>
+          <a:blip r:embed="rId3"/>
+          <a:stretch>
+            <a:fillRect/>
+          </a:stretch>
+        </p:blipFill>
+        <p:spPr>
+          <a:xfrm>
+            <a:off x="7152264" y="3319943"/>
+            <a:ext cx="4800000" cy="3352381"/>
+          </a:xfrm>
+          <a:prstGeom prst="rect">
+            <a:avLst/>
+          </a:prstGeom>
+        </p:spPr>
+      </p:pic>
+      <p:sp>
+        <p:nvSpPr>
+          <p:cNvPr id="7" name="TextBox 6">
+            <a:extLst>
+              <a:ext uri="{FF2B5EF4-FFF2-40B4-BE49-F238E27FC236}">
+                <a16:creationId xmlns:a16="http://schemas.microsoft.com/office/drawing/2014/main" id="{A4FF0A56-F7F1-4768-A3BA-E6C82DAA6C7B}"/>
+              </a:ext>
+            </a:extLst>
+          </p:cNvPr>
+          <p:cNvSpPr txBox="1"/>
+          <p:nvPr/>
+        </p:nvSpPr>
+        <p:spPr>
+          <a:xfrm>
+            <a:off x="606104" y="4106222"/>
+            <a:ext cx="6094602" cy="923330"/>
+          </a:xfrm>
+          <a:prstGeom prst="rect">
+            <a:avLst/>
+          </a:prstGeom>
+          <a:noFill/>
+        </p:spPr>
+        <p:txBody>
+          <a:bodyPr wrap="square">
+            <a:spAutoFit/>
+          </a:bodyPr>
+          <a:lstStyle/>
+          <a:p>
+            <a:r>
+              <a:rPr lang="en-US" dirty="0"/>
+              <a:t>RHO </a:t>
+            </a:r>
+            <a:r>
+              <a:rPr lang="en-US" dirty="0" err="1"/>
+              <a:t>cov</a:t>
+            </a:r>
+            <a:r>
+              <a:rPr lang="en-US" dirty="0"/>
+              <a:t> info: mean=0.08 - </a:t>
+            </a:r>
+            <a:r>
+              <a:rPr lang="en-US" dirty="0" err="1"/>
+              <a:t>sd</a:t>
+            </a:r>
+            <a:r>
+              <a:rPr lang="en-US" dirty="0"/>
+              <a:t>=0.06</a:t>
+            </a:r>
+          </a:p>
+          <a:p>
+            <a:endParaRPr lang="en-US" dirty="0"/>
+          </a:p>
+          <a:p>
+            <a:r>
+              <a:rPr lang="en-US" dirty="0"/>
+              <a:t>SD </a:t>
+            </a:r>
+            <a:r>
+              <a:rPr lang="en-US" dirty="0" err="1"/>
+              <a:t>cov</a:t>
+            </a:r>
+            <a:r>
+              <a:rPr lang="en-US" dirty="0"/>
+              <a:t> info: mean=1.09 - </a:t>
+            </a:r>
+            <a:r>
+              <a:rPr lang="en-US" dirty="0" err="1"/>
+              <a:t>sd</a:t>
+            </a:r>
+            <a:r>
+              <a:rPr lang="en-US" dirty="0"/>
+              <a:t>=0.07</a:t>
+            </a:r>
+          </a:p>
+        </p:txBody>
+      </p:sp>
+    </p:spTree>
+    <p:extLst>
+      <p:ext uri="{BB962C8B-B14F-4D97-AF65-F5344CB8AC3E}">
+        <p14:creationId xmlns:p14="http://schemas.microsoft.com/office/powerpoint/2010/main" val="900705648"/>
+      </p:ext>
+    </p:extLst>
+  </p:cSld>
+  <p:clrMapOvr>
+    <a:masterClrMapping/>
+  </p:clrMapOvr>
+</p:sld>
+</file>
+
+<file path=ppt/slides/slide14.xml><?xml version="1.0" encoding="utf-8"?>
+<p:sld xmlns:a="http://schemas.openxmlformats.org/drawingml/2006/main" xmlns:r="http://schemas.openxmlformats.org/officeDocument/2006/relationships" xmlns:p="http://schemas.openxmlformats.org/presentationml/2006/main">
+  <p:cSld>
+    <p:spTree>
+      <p:nvGrpSpPr>
+        <p:cNvPr id="1" name=""/>
+        <p:cNvGrpSpPr/>
+        <p:nvPr/>
+      </p:nvGrpSpPr>
+      <p:grpSpPr>
+        <a:xfrm>
+          <a:off x="0" y="0"/>
+          <a:ext cx="0" cy="0"/>
+          <a:chOff x="0" y="0"/>
+          <a:chExt cx="0" cy="0"/>
+        </a:xfrm>
+      </p:grpSpPr>
+      <p:sp>
+        <p:nvSpPr>
+          <p:cNvPr id="2" name="Title 1">
+            <a:extLst>
+              <a:ext uri="{FF2B5EF4-FFF2-40B4-BE49-F238E27FC236}">
+                <a16:creationId xmlns:a16="http://schemas.microsoft.com/office/drawing/2014/main" id="{CCBBFE0B-FB2B-4D56-953D-CF2B45A5FD5F}"/>
+              </a:ext>
+            </a:extLst>
+          </p:cNvPr>
+          <p:cNvSpPr>
+            <a:spLocks noGrp="1"/>
+          </p:cNvSpPr>
+          <p:nvPr>
+            <p:ph type="title"/>
+          </p:nvPr>
+        </p:nvSpPr>
+        <p:spPr/>
+        <p:txBody>
+          <a:bodyPr/>
+          <a:lstStyle/>
+          <a:p>
+            <a:r>
+              <a:rPr lang="en-US" dirty="0"/>
+              <a:t>Synthetic 0.2 </a:t>
+            </a:r>
+          </a:p>
+        </p:txBody>
+      </p:sp>
+      <mc:AlternateContent xmlns:mc="http://schemas.openxmlformats.org/markup-compatibility/2006">
+        <mc:Choice xmlns:a14="http://schemas.microsoft.com/office/drawing/2010/main" Requires="a14">
+          <p:sp>
+            <p:nvSpPr>
+              <p:cNvPr id="3" name="Content Placeholder 2">
+                <a:extLst>
+                  <a:ext uri="{FF2B5EF4-FFF2-40B4-BE49-F238E27FC236}">
+                    <a16:creationId xmlns:a16="http://schemas.microsoft.com/office/drawing/2014/main" id="{ADCE720B-ACA3-4266-910F-47D85CD0AB03}"/>
+                  </a:ext>
+                </a:extLst>
+              </p:cNvPr>
+              <p:cNvSpPr>
+                <a:spLocks noGrp="1"/>
+              </p:cNvSpPr>
+              <p:nvPr>
+                <p:ph idx="1"/>
+              </p:nvPr>
+            </p:nvSpPr>
+            <p:spPr/>
+            <p:txBody>
+              <a:bodyPr/>
+              <a:lstStyle/>
+              <a:p>
+                <a:pPr marL="0" indent="0">
+                  <a:buNone/>
+                </a:pPr>
+                <a:r>
+                  <a:rPr lang="el-GR" dirty="0">
+                    <a:latin typeface="Cambria Math" panose="02040503050406030204" pitchFamily="18" charset="0"/>
+                    <a:ea typeface="Cambria Math" panose="02040503050406030204" pitchFamily="18" charset="0"/>
+                  </a:rPr>
+                  <a:t>ρ</a:t>
+                </a:r>
+                <a:r>
+                  <a:rPr lang="en-US" dirty="0">
+                    <a:latin typeface="Cambria Math" panose="02040503050406030204" pitchFamily="18" charset="0"/>
+                    <a:ea typeface="Cambria Math" panose="02040503050406030204" pitchFamily="18" charset="0"/>
+                  </a:rPr>
+                  <a:t>= beta ( </a:t>
+                </a:r>
+                <a:r>
+                  <a:rPr lang="el-GR" dirty="0">
+                    <a:latin typeface="Cambria Math" panose="02040503050406030204" pitchFamily="18" charset="0"/>
+                    <a:ea typeface="Cambria Math" panose="02040503050406030204" pitchFamily="18" charset="0"/>
+                  </a:rPr>
+                  <a:t>α</a:t>
+                </a:r>
+                <a:r>
+                  <a:rPr lang="en-US" dirty="0">
+                    <a:latin typeface="Cambria Math" panose="02040503050406030204" pitchFamily="18" charset="0"/>
+                    <a:ea typeface="Cambria Math" panose="02040503050406030204" pitchFamily="18" charset="0"/>
+                  </a:rPr>
+                  <a:t>=1, </a:t>
+                </a:r>
+                <a:r>
+                  <a:rPr lang="el-GR" dirty="0">
+                    <a:latin typeface="Cambria Math" panose="02040503050406030204" pitchFamily="18" charset="0"/>
+                    <a:ea typeface="Cambria Math" panose="02040503050406030204" pitchFamily="18" charset="0"/>
+                  </a:rPr>
+                  <a:t>β</a:t>
+                </a:r>
+                <a:r>
+                  <a:rPr lang="en-US" dirty="0">
+                    <a:latin typeface="Cambria Math" panose="02040503050406030204" pitchFamily="18" charset="0"/>
+                    <a:ea typeface="Cambria Math" panose="02040503050406030204" pitchFamily="18" charset="0"/>
+                  </a:rPr>
+                  <a:t>=10)  → Mean = </a:t>
+                </a:r>
+                <a14:m>
+                  <m:oMath xmlns:m="http://schemas.openxmlformats.org/officeDocument/2006/math">
+                    <m:f>
+                      <m:fPr>
+                        <m:ctrlPr>
+                          <a:rPr lang="en-US" i="1" smtClean="0">
+                            <a:latin typeface="Cambria Math" panose="02040503050406030204" pitchFamily="18" charset="0"/>
+                            <a:ea typeface="Cambria Math" panose="02040503050406030204" pitchFamily="18" charset="0"/>
+                          </a:rPr>
+                        </m:ctrlPr>
+                      </m:fPr>
+                      <m:num>
+                        <m:r>
+                          <m:rPr>
+                            <m:nor/>
+                          </m:rPr>
+                          <a:rPr lang="el-GR" dirty="0">
+                            <a:latin typeface="Cambria Math" panose="02040503050406030204" pitchFamily="18" charset="0"/>
+                            <a:ea typeface="Cambria Math" panose="02040503050406030204" pitchFamily="18" charset="0"/>
+                          </a:rPr>
+                          <m:t>α</m:t>
+                        </m:r>
+                      </m:num>
+                      <m:den>
+                        <m:r>
+                          <m:rPr>
+                            <m:nor/>
+                          </m:rPr>
+                          <a:rPr lang="el-GR" dirty="0">
+                            <a:latin typeface="Cambria Math" panose="02040503050406030204" pitchFamily="18" charset="0"/>
+                            <a:ea typeface="Cambria Math" panose="02040503050406030204" pitchFamily="18" charset="0"/>
+                          </a:rPr>
+                          <m:t>α</m:t>
+                        </m:r>
+                        <m:r>
+                          <a:rPr lang="en-US" b="0" i="1" dirty="0" smtClean="0">
+                            <a:latin typeface="Cambria Math" panose="02040503050406030204" pitchFamily="18" charset="0"/>
+                            <a:ea typeface="Cambria Math" panose="02040503050406030204" pitchFamily="18" charset="0"/>
+                          </a:rPr>
+                          <m:t>+</m:t>
+                        </m:r>
+                        <m:r>
+                          <m:rPr>
+                            <m:nor/>
+                          </m:rPr>
+                          <a:rPr lang="el-GR" dirty="0">
+                            <a:latin typeface="Cambria Math" panose="02040503050406030204" pitchFamily="18" charset="0"/>
+                            <a:ea typeface="Cambria Math" panose="02040503050406030204" pitchFamily="18" charset="0"/>
+                          </a:rPr>
+                          <m:t>β</m:t>
+                        </m:r>
+                      </m:den>
+                    </m:f>
+                    <m:r>
+                      <a:rPr lang="en-US" b="0" i="1" smtClean="0">
+                        <a:latin typeface="Cambria Math" panose="02040503050406030204" pitchFamily="18" charset="0"/>
+                        <a:ea typeface="Cambria Math" panose="02040503050406030204" pitchFamily="18" charset="0"/>
+                      </a:rPr>
+                      <m:t>=</m:t>
+                    </m:r>
+                    <m:f>
+                      <m:fPr>
+                        <m:ctrlPr>
+                          <a:rPr lang="en-US" b="0" i="1" smtClean="0">
+                            <a:latin typeface="Cambria Math" panose="02040503050406030204" pitchFamily="18" charset="0"/>
+                            <a:ea typeface="Cambria Math" panose="02040503050406030204" pitchFamily="18" charset="0"/>
+                          </a:rPr>
+                        </m:ctrlPr>
+                      </m:fPr>
+                      <m:num>
+                        <m:r>
+                          <a:rPr lang="en-US" b="0" i="1" smtClean="0">
+                            <a:latin typeface="Cambria Math" panose="02040503050406030204" pitchFamily="18" charset="0"/>
+                            <a:ea typeface="Cambria Math" panose="02040503050406030204" pitchFamily="18" charset="0"/>
+                          </a:rPr>
+                          <m:t>1</m:t>
+                        </m:r>
+                      </m:num>
+                      <m:den>
+                        <m:r>
+                          <a:rPr lang="en-US" b="0" i="1" smtClean="0">
+                            <a:latin typeface="Cambria Math" panose="02040503050406030204" pitchFamily="18" charset="0"/>
+                            <a:ea typeface="Cambria Math" panose="02040503050406030204" pitchFamily="18" charset="0"/>
+                          </a:rPr>
+                          <m:t>11</m:t>
+                        </m:r>
+                      </m:den>
+                    </m:f>
+                  </m:oMath>
+                </a14:m>
+                <a:endParaRPr lang="en-US" dirty="0"/>
+              </a:p>
+              <a:p>
+                <a:pPr marL="0" indent="0">
+                  <a:buNone/>
+                </a:pPr>
+                <a:r>
+                  <a:rPr lang="el-GR" dirty="0">
+                    <a:latin typeface="Cambria Math" panose="02040503050406030204" pitchFamily="18" charset="0"/>
+                    <a:ea typeface="Cambria Math" panose="02040503050406030204" pitchFamily="18" charset="0"/>
+                  </a:rPr>
+                  <a:t>σ</a:t>
+                </a:r>
+                <a:r>
+                  <a:rPr lang="en-US" dirty="0">
+                    <a:latin typeface="Cambria Math" panose="02040503050406030204" pitchFamily="18" charset="0"/>
+                    <a:ea typeface="Cambria Math" panose="02040503050406030204" pitchFamily="18" charset="0"/>
+                  </a:rPr>
+                  <a:t>= beta ( </a:t>
+                </a:r>
+                <a:r>
+                  <a:rPr lang="el-GR" dirty="0">
+                    <a:latin typeface="Cambria Math" panose="02040503050406030204" pitchFamily="18" charset="0"/>
+                    <a:ea typeface="Cambria Math" panose="02040503050406030204" pitchFamily="18" charset="0"/>
+                  </a:rPr>
+                  <a:t>α</a:t>
+                </a:r>
+                <a:r>
+                  <a:rPr lang="en-US" dirty="0">
+                    <a:latin typeface="Cambria Math" panose="02040503050406030204" pitchFamily="18" charset="0"/>
+                    <a:ea typeface="Cambria Math" panose="02040503050406030204" pitchFamily="18" charset="0"/>
+                  </a:rPr>
+                  <a:t>=2, </a:t>
+                </a:r>
+                <a:r>
+                  <a:rPr lang="el-GR" dirty="0">
+                    <a:latin typeface="Cambria Math" panose="02040503050406030204" pitchFamily="18" charset="0"/>
+                    <a:ea typeface="Cambria Math" panose="02040503050406030204" pitchFamily="18" charset="0"/>
+                  </a:rPr>
+                  <a:t>β</a:t>
+                </a:r>
+                <a:r>
+                  <a:rPr lang="en-US" dirty="0">
+                    <a:latin typeface="Cambria Math" panose="02040503050406030204" pitchFamily="18" charset="0"/>
+                    <a:ea typeface="Cambria Math" panose="02040503050406030204" pitchFamily="18" charset="0"/>
+                  </a:rPr>
+                  <a:t>=1)  → Mean = </a:t>
+                </a:r>
+                <a14:m>
+                  <m:oMath xmlns:m="http://schemas.openxmlformats.org/officeDocument/2006/math">
+                    <m:f>
+                      <m:fPr>
+                        <m:ctrlPr>
+                          <a:rPr lang="en-US" i="1" smtClean="0">
+                            <a:latin typeface="Cambria Math" panose="02040503050406030204" pitchFamily="18" charset="0"/>
+                            <a:ea typeface="Cambria Math" panose="02040503050406030204" pitchFamily="18" charset="0"/>
+                          </a:rPr>
+                        </m:ctrlPr>
+                      </m:fPr>
+                      <m:num>
+                        <m:r>
+                          <m:rPr>
+                            <m:nor/>
+                          </m:rPr>
+                          <a:rPr lang="el-GR" dirty="0">
+                            <a:latin typeface="Cambria Math" panose="02040503050406030204" pitchFamily="18" charset="0"/>
+                            <a:ea typeface="Cambria Math" panose="02040503050406030204" pitchFamily="18" charset="0"/>
+                          </a:rPr>
+                          <m:t>β</m:t>
+                        </m:r>
+                      </m:num>
+                      <m:den>
+                        <m:r>
+                          <m:rPr>
+                            <m:nor/>
+                          </m:rPr>
+                          <a:rPr lang="el-GR" dirty="0">
+                            <a:latin typeface="Cambria Math" panose="02040503050406030204" pitchFamily="18" charset="0"/>
+                            <a:ea typeface="Cambria Math" panose="02040503050406030204" pitchFamily="18" charset="0"/>
+                          </a:rPr>
+                          <m:t>α</m:t>
+                        </m:r>
+                        <m:r>
+                          <a:rPr lang="en-US" b="0" i="1" dirty="0" smtClean="0">
+                            <a:latin typeface="Cambria Math" panose="02040503050406030204" pitchFamily="18" charset="0"/>
+                            <a:ea typeface="Cambria Math" panose="02040503050406030204" pitchFamily="18" charset="0"/>
+                          </a:rPr>
+                          <m:t>−1</m:t>
+                        </m:r>
+                      </m:den>
+                    </m:f>
+                    <m:r>
+                      <a:rPr lang="en-US" b="0" i="1" smtClean="0">
+                        <a:latin typeface="Cambria Math" panose="02040503050406030204" pitchFamily="18" charset="0"/>
+                        <a:ea typeface="Cambria Math" panose="02040503050406030204" pitchFamily="18" charset="0"/>
+                      </a:rPr>
+                      <m:t>=</m:t>
+                    </m:r>
+                    <m:f>
+                      <m:fPr>
+                        <m:ctrlPr>
+                          <a:rPr lang="en-US" b="0" i="1" smtClean="0">
+                            <a:latin typeface="Cambria Math" panose="02040503050406030204" pitchFamily="18" charset="0"/>
+                            <a:ea typeface="Cambria Math" panose="02040503050406030204" pitchFamily="18" charset="0"/>
+                          </a:rPr>
+                        </m:ctrlPr>
+                      </m:fPr>
+                      <m:num>
+                        <m:r>
+                          <a:rPr lang="en-US" b="0" i="1" smtClean="0">
+                            <a:latin typeface="Cambria Math" panose="02040503050406030204" pitchFamily="18" charset="0"/>
+                            <a:ea typeface="Cambria Math" panose="02040503050406030204" pitchFamily="18" charset="0"/>
+                          </a:rPr>
+                          <m:t>1</m:t>
+                        </m:r>
+                      </m:num>
+                      <m:den>
+                        <m:r>
+                          <a:rPr lang="en-US" b="0" i="1" smtClean="0">
+                            <a:latin typeface="Cambria Math" panose="02040503050406030204" pitchFamily="18" charset="0"/>
+                            <a:ea typeface="Cambria Math" panose="02040503050406030204" pitchFamily="18" charset="0"/>
+                          </a:rPr>
+                          <m:t>1</m:t>
+                        </m:r>
+                      </m:den>
+                    </m:f>
+                    <m:r>
+                      <a:rPr lang="en-US" b="0" i="1" smtClean="0">
+                        <a:latin typeface="Cambria Math" panose="02040503050406030204" pitchFamily="18" charset="0"/>
+                        <a:ea typeface="Cambria Math" panose="02040503050406030204" pitchFamily="18" charset="0"/>
+                      </a:rPr>
+                      <m:t>=1</m:t>
+                    </m:r>
+                  </m:oMath>
+                </a14:m>
+                <a:endParaRPr lang="en-US" dirty="0"/>
+              </a:p>
+              <a:p>
+                <a:pPr marL="0" indent="0">
+                  <a:buNone/>
+                </a:pPr>
+                <a:endParaRPr lang="en-US" dirty="0"/>
+              </a:p>
+            </p:txBody>
+          </p:sp>
+        </mc:Choice>
+        <mc:Fallback>
+          <p:sp>
+            <p:nvSpPr>
+              <p:cNvPr id="3" name="Content Placeholder 2">
+                <a:extLst>
+                  <a:ext uri="{FF2B5EF4-FFF2-40B4-BE49-F238E27FC236}">
+                    <a16:creationId xmlns:a16="http://schemas.microsoft.com/office/drawing/2014/main" id="{ADCE720B-ACA3-4266-910F-47D85CD0AB03}"/>
+                  </a:ext>
+                </a:extLst>
+              </p:cNvPr>
+              <p:cNvSpPr>
+                <a:spLocks noGrp="1" noRot="1" noChangeAspect="1" noMove="1" noResize="1" noEditPoints="1" noAdjustHandles="1" noChangeArrowheads="1" noChangeShapeType="1" noTextEdit="1"/>
+              </p:cNvSpPr>
+              <p:nvPr>
+                <p:ph idx="1"/>
+              </p:nvPr>
+            </p:nvSpPr>
+            <p:spPr>
+              <a:blipFill>
+                <a:blip r:embed="rId2"/>
+                <a:stretch>
+                  <a:fillRect l="-1217" t="-700"/>
+                </a:stretch>
+              </a:blipFill>
+            </p:spPr>
+            <p:txBody>
+              <a:bodyPr/>
+              <a:lstStyle/>
+              <a:p>
+                <a:r>
+                  <a:rPr lang="en-US">
+                    <a:noFill/>
+                  </a:rPr>
+                  <a:t> </a:t>
+                </a:r>
+              </a:p>
+            </p:txBody>
+          </p:sp>
+        </mc:Fallback>
+      </mc:AlternateContent>
+      <p:pic>
+        <p:nvPicPr>
+          <p:cNvPr id="5" name="Picture 4">
+            <a:extLst>
+              <a:ext uri="{FF2B5EF4-FFF2-40B4-BE49-F238E27FC236}">
+                <a16:creationId xmlns:a16="http://schemas.microsoft.com/office/drawing/2014/main" id="{DF94AFCE-DC30-48FD-9163-7595E5C301E7}"/>
+              </a:ext>
+            </a:extLst>
+          </p:cNvPr>
+          <p:cNvPicPr>
+            <a:picLocks noChangeAspect="1"/>
+          </p:cNvPicPr>
+          <p:nvPr/>
+        </p:nvPicPr>
+        <p:blipFill>
+          <a:blip r:embed="rId3"/>
+          <a:stretch>
+            <a:fillRect/>
+          </a:stretch>
+        </p:blipFill>
+        <p:spPr>
+          <a:xfrm>
+            <a:off x="7152264" y="3319943"/>
+            <a:ext cx="4800000" cy="3352381"/>
+          </a:xfrm>
+          <a:prstGeom prst="rect">
+            <a:avLst/>
+          </a:prstGeom>
+        </p:spPr>
+      </p:pic>
+      <p:sp>
+        <p:nvSpPr>
+          <p:cNvPr id="7" name="TextBox 6">
+            <a:extLst>
+              <a:ext uri="{FF2B5EF4-FFF2-40B4-BE49-F238E27FC236}">
+                <a16:creationId xmlns:a16="http://schemas.microsoft.com/office/drawing/2014/main" id="{A4FF0A56-F7F1-4768-A3BA-E6C82DAA6C7B}"/>
+              </a:ext>
+            </a:extLst>
+          </p:cNvPr>
+          <p:cNvSpPr txBox="1"/>
+          <p:nvPr/>
+        </p:nvSpPr>
+        <p:spPr>
+          <a:xfrm>
+            <a:off x="606104" y="4106222"/>
+            <a:ext cx="6094602" cy="923330"/>
+          </a:xfrm>
+          <a:prstGeom prst="rect">
+            <a:avLst/>
+          </a:prstGeom>
+          <a:noFill/>
+        </p:spPr>
+        <p:txBody>
+          <a:bodyPr wrap="square">
+            <a:spAutoFit/>
+          </a:bodyPr>
+          <a:lstStyle/>
+          <a:p>
+            <a:r>
+              <a:rPr lang="en-US" dirty="0"/>
+              <a:t>RHO </a:t>
+            </a:r>
+            <a:r>
+              <a:rPr lang="en-US" dirty="0" err="1"/>
+              <a:t>cov</a:t>
+            </a:r>
+            <a:r>
+              <a:rPr lang="en-US" dirty="0"/>
+              <a:t> info: mean=0.08 - </a:t>
+            </a:r>
+            <a:r>
+              <a:rPr lang="en-US" dirty="0" err="1"/>
+              <a:t>sd</a:t>
+            </a:r>
+            <a:r>
+              <a:rPr lang="en-US" dirty="0"/>
+              <a:t>=0.06</a:t>
+            </a:r>
+          </a:p>
+          <a:p>
+            <a:endParaRPr lang="en-US" dirty="0"/>
+          </a:p>
+          <a:p>
+            <a:r>
+              <a:rPr lang="en-US" dirty="0"/>
+              <a:t>SD </a:t>
+            </a:r>
+            <a:r>
+              <a:rPr lang="en-US" dirty="0" err="1"/>
+              <a:t>cov</a:t>
+            </a:r>
+            <a:r>
+              <a:rPr lang="en-US" dirty="0"/>
+              <a:t> info: mean=1.14 - </a:t>
+            </a:r>
+            <a:r>
+              <a:rPr lang="en-US" dirty="0" err="1"/>
+              <a:t>sd</a:t>
+            </a:r>
+            <a:r>
+              <a:rPr lang="en-US" dirty="0"/>
+              <a:t>=0.07</a:t>
+            </a:r>
+          </a:p>
+        </p:txBody>
+      </p:sp>
+    </p:spTree>
+    <p:extLst>
+      <p:ext uri="{BB962C8B-B14F-4D97-AF65-F5344CB8AC3E}">
+        <p14:creationId xmlns:p14="http://schemas.microsoft.com/office/powerpoint/2010/main" val="2056364223"/>
+      </p:ext>
+    </p:extLst>
+  </p:cSld>
+  <p:clrMapOvr>
+    <a:masterClrMapping/>
+  </p:clrMapOvr>
+</p:sld>
+</file>
+
+<file path=ppt/slides/slide15.xml><?xml version="1.0" encoding="utf-8"?>
+<p:sld xmlns:a="http://schemas.openxmlformats.org/drawingml/2006/main" xmlns:r="http://schemas.openxmlformats.org/officeDocument/2006/relationships" xmlns:p="http://schemas.openxmlformats.org/presentationml/2006/main">
+  <p:cSld>
+    <p:spTree>
+      <p:nvGrpSpPr>
+        <p:cNvPr id="1" name=""/>
+        <p:cNvGrpSpPr/>
+        <p:nvPr/>
+      </p:nvGrpSpPr>
+      <p:grpSpPr>
+        <a:xfrm>
+          <a:off x="0" y="0"/>
+          <a:ext cx="0" cy="0"/>
+          <a:chOff x="0" y="0"/>
+          <a:chExt cx="0" cy="0"/>
+        </a:xfrm>
+      </p:grpSpPr>
+      <p:sp>
+        <p:nvSpPr>
+          <p:cNvPr id="2" name="Title 1">
+            <a:extLst>
+              <a:ext uri="{FF2B5EF4-FFF2-40B4-BE49-F238E27FC236}">
+                <a16:creationId xmlns:a16="http://schemas.microsoft.com/office/drawing/2014/main" id="{CCBBFE0B-FB2B-4D56-953D-CF2B45A5FD5F}"/>
+              </a:ext>
+            </a:extLst>
+          </p:cNvPr>
+          <p:cNvSpPr>
+            <a:spLocks noGrp="1"/>
+          </p:cNvSpPr>
+          <p:nvPr>
+            <p:ph type="title"/>
+          </p:nvPr>
+        </p:nvSpPr>
+        <p:spPr/>
+        <p:txBody>
+          <a:bodyPr/>
+          <a:lstStyle/>
+          <a:p>
+            <a:r>
+              <a:rPr lang="en-US" dirty="0"/>
+              <a:t>Synthetic 0.0 </a:t>
+            </a:r>
+          </a:p>
+        </p:txBody>
+      </p:sp>
+      <mc:AlternateContent xmlns:mc="http://schemas.openxmlformats.org/markup-compatibility/2006">
+        <mc:Choice xmlns:a14="http://schemas.microsoft.com/office/drawing/2010/main" Requires="a14">
+          <p:sp>
+            <p:nvSpPr>
+              <p:cNvPr id="3" name="Content Placeholder 2">
+                <a:extLst>
+                  <a:ext uri="{FF2B5EF4-FFF2-40B4-BE49-F238E27FC236}">
+                    <a16:creationId xmlns:a16="http://schemas.microsoft.com/office/drawing/2014/main" id="{ADCE720B-ACA3-4266-910F-47D85CD0AB03}"/>
+                  </a:ext>
+                </a:extLst>
+              </p:cNvPr>
+              <p:cNvSpPr>
+                <a:spLocks noGrp="1"/>
+              </p:cNvSpPr>
+              <p:nvPr>
+                <p:ph idx="1"/>
+              </p:nvPr>
+            </p:nvSpPr>
+            <p:spPr/>
+            <p:txBody>
+              <a:bodyPr/>
+              <a:lstStyle/>
+              <a:p>
+                <a:pPr marL="0" indent="0">
+                  <a:buNone/>
+                </a:pPr>
+                <a:r>
+                  <a:rPr lang="el-GR" dirty="0">
+                    <a:latin typeface="Cambria Math" panose="02040503050406030204" pitchFamily="18" charset="0"/>
+                    <a:ea typeface="Cambria Math" panose="02040503050406030204" pitchFamily="18" charset="0"/>
+                  </a:rPr>
+                  <a:t>ρ</a:t>
+                </a:r>
+                <a:r>
+                  <a:rPr lang="en-US" dirty="0">
+                    <a:latin typeface="Cambria Math" panose="02040503050406030204" pitchFamily="18" charset="0"/>
+                    <a:ea typeface="Cambria Math" panose="02040503050406030204" pitchFamily="18" charset="0"/>
+                  </a:rPr>
+                  <a:t>= beta ( </a:t>
+                </a:r>
+                <a:r>
+                  <a:rPr lang="el-GR" dirty="0">
+                    <a:latin typeface="Cambria Math" panose="02040503050406030204" pitchFamily="18" charset="0"/>
+                    <a:ea typeface="Cambria Math" panose="02040503050406030204" pitchFamily="18" charset="0"/>
+                  </a:rPr>
+                  <a:t>α</a:t>
+                </a:r>
+                <a:r>
+                  <a:rPr lang="en-US" dirty="0">
+                    <a:latin typeface="Cambria Math" panose="02040503050406030204" pitchFamily="18" charset="0"/>
+                    <a:ea typeface="Cambria Math" panose="02040503050406030204" pitchFamily="18" charset="0"/>
+                  </a:rPr>
+                  <a:t>=1, </a:t>
+                </a:r>
+                <a:r>
+                  <a:rPr lang="el-GR" dirty="0">
+                    <a:latin typeface="Cambria Math" panose="02040503050406030204" pitchFamily="18" charset="0"/>
+                    <a:ea typeface="Cambria Math" panose="02040503050406030204" pitchFamily="18" charset="0"/>
+                  </a:rPr>
+                  <a:t>β</a:t>
+                </a:r>
+                <a:r>
+                  <a:rPr lang="en-US" dirty="0">
+                    <a:latin typeface="Cambria Math" panose="02040503050406030204" pitchFamily="18" charset="0"/>
+                    <a:ea typeface="Cambria Math" panose="02040503050406030204" pitchFamily="18" charset="0"/>
+                  </a:rPr>
+                  <a:t>=4)  → Mean = </a:t>
+                </a:r>
+                <a14:m>
+                  <m:oMath xmlns:m="http://schemas.openxmlformats.org/officeDocument/2006/math">
+                    <m:f>
+                      <m:fPr>
+                        <m:ctrlPr>
+                          <a:rPr lang="en-US" i="1" smtClean="0">
+                            <a:latin typeface="Cambria Math" panose="02040503050406030204" pitchFamily="18" charset="0"/>
+                            <a:ea typeface="Cambria Math" panose="02040503050406030204" pitchFamily="18" charset="0"/>
+                          </a:rPr>
+                        </m:ctrlPr>
+                      </m:fPr>
+                      <m:num>
+                        <m:r>
+                          <m:rPr>
+                            <m:nor/>
+                          </m:rPr>
+                          <a:rPr lang="el-GR" dirty="0">
+                            <a:latin typeface="Cambria Math" panose="02040503050406030204" pitchFamily="18" charset="0"/>
+                            <a:ea typeface="Cambria Math" panose="02040503050406030204" pitchFamily="18" charset="0"/>
+                          </a:rPr>
+                          <m:t>α</m:t>
+                        </m:r>
+                      </m:num>
+                      <m:den>
+                        <m:r>
+                          <m:rPr>
+                            <m:nor/>
+                          </m:rPr>
+                          <a:rPr lang="el-GR" dirty="0">
+                            <a:latin typeface="Cambria Math" panose="02040503050406030204" pitchFamily="18" charset="0"/>
+                            <a:ea typeface="Cambria Math" panose="02040503050406030204" pitchFamily="18" charset="0"/>
+                          </a:rPr>
+                          <m:t>α</m:t>
+                        </m:r>
+                        <m:r>
+                          <a:rPr lang="en-US" b="0" i="1" dirty="0" smtClean="0">
+                            <a:latin typeface="Cambria Math" panose="02040503050406030204" pitchFamily="18" charset="0"/>
+                            <a:ea typeface="Cambria Math" panose="02040503050406030204" pitchFamily="18" charset="0"/>
+                          </a:rPr>
+                          <m:t>+</m:t>
+                        </m:r>
+                        <m:r>
+                          <m:rPr>
+                            <m:nor/>
+                          </m:rPr>
+                          <a:rPr lang="el-GR" dirty="0">
+                            <a:latin typeface="Cambria Math" panose="02040503050406030204" pitchFamily="18" charset="0"/>
+                            <a:ea typeface="Cambria Math" panose="02040503050406030204" pitchFamily="18" charset="0"/>
+                          </a:rPr>
+                          <m:t>β</m:t>
+                        </m:r>
+                      </m:den>
+                    </m:f>
+                    <m:r>
+                      <a:rPr lang="en-US" b="0" i="1" smtClean="0">
+                        <a:latin typeface="Cambria Math" panose="02040503050406030204" pitchFamily="18" charset="0"/>
+                        <a:ea typeface="Cambria Math" panose="02040503050406030204" pitchFamily="18" charset="0"/>
+                      </a:rPr>
+                      <m:t>=</m:t>
+                    </m:r>
+                    <m:f>
+                      <m:fPr>
+                        <m:ctrlPr>
+                          <a:rPr lang="en-US" b="0" i="1" smtClean="0">
+                            <a:latin typeface="Cambria Math" panose="02040503050406030204" pitchFamily="18" charset="0"/>
+                            <a:ea typeface="Cambria Math" panose="02040503050406030204" pitchFamily="18" charset="0"/>
+                          </a:rPr>
+                        </m:ctrlPr>
+                      </m:fPr>
+                      <m:num>
+                        <m:r>
+                          <a:rPr lang="en-US" b="0" i="1" smtClean="0">
+                            <a:latin typeface="Cambria Math" panose="02040503050406030204" pitchFamily="18" charset="0"/>
+                            <a:ea typeface="Cambria Math" panose="02040503050406030204" pitchFamily="18" charset="0"/>
+                          </a:rPr>
+                          <m:t>1</m:t>
+                        </m:r>
+                      </m:num>
+                      <m:den>
+                        <m:r>
+                          <a:rPr lang="en-US" b="0" i="1" smtClean="0">
+                            <a:latin typeface="Cambria Math" panose="02040503050406030204" pitchFamily="18" charset="0"/>
+                            <a:ea typeface="Cambria Math" panose="02040503050406030204" pitchFamily="18" charset="0"/>
+                          </a:rPr>
+                          <m:t>5</m:t>
+                        </m:r>
+                      </m:den>
+                    </m:f>
+                  </m:oMath>
+                </a14:m>
+                <a:endParaRPr lang="en-US" dirty="0"/>
+              </a:p>
+              <a:p>
+                <a:pPr marL="0" indent="0">
+                  <a:buNone/>
+                </a:pPr>
+                <a:r>
+                  <a:rPr lang="el-GR" dirty="0">
+                    <a:latin typeface="Cambria Math" panose="02040503050406030204" pitchFamily="18" charset="0"/>
+                    <a:ea typeface="Cambria Math" panose="02040503050406030204" pitchFamily="18" charset="0"/>
+                  </a:rPr>
+                  <a:t>σ</a:t>
+                </a:r>
+                <a:r>
+                  <a:rPr lang="en-US" dirty="0">
+                    <a:latin typeface="Cambria Math" panose="02040503050406030204" pitchFamily="18" charset="0"/>
+                    <a:ea typeface="Cambria Math" panose="02040503050406030204" pitchFamily="18" charset="0"/>
+                  </a:rPr>
+                  <a:t>= beta ( </a:t>
+                </a:r>
+                <a:r>
+                  <a:rPr lang="el-GR" dirty="0">
+                    <a:latin typeface="Cambria Math" panose="02040503050406030204" pitchFamily="18" charset="0"/>
+                    <a:ea typeface="Cambria Math" panose="02040503050406030204" pitchFamily="18" charset="0"/>
+                  </a:rPr>
+                  <a:t>α</a:t>
+                </a:r>
+                <a:r>
+                  <a:rPr lang="en-US" dirty="0">
+                    <a:latin typeface="Cambria Math" panose="02040503050406030204" pitchFamily="18" charset="0"/>
+                    <a:ea typeface="Cambria Math" panose="02040503050406030204" pitchFamily="18" charset="0"/>
+                  </a:rPr>
+                  <a:t>=2, </a:t>
+                </a:r>
+                <a:r>
+                  <a:rPr lang="el-GR" dirty="0">
+                    <a:latin typeface="Cambria Math" panose="02040503050406030204" pitchFamily="18" charset="0"/>
+                    <a:ea typeface="Cambria Math" panose="02040503050406030204" pitchFamily="18" charset="0"/>
+                  </a:rPr>
+                  <a:t>β</a:t>
+                </a:r>
+                <a:r>
+                  <a:rPr lang="en-US" dirty="0">
+                    <a:latin typeface="Cambria Math" panose="02040503050406030204" pitchFamily="18" charset="0"/>
+                    <a:ea typeface="Cambria Math" panose="02040503050406030204" pitchFamily="18" charset="0"/>
+                  </a:rPr>
+                  <a:t>=1)  → Mean = </a:t>
+                </a:r>
+                <a14:m>
+                  <m:oMath xmlns:m="http://schemas.openxmlformats.org/officeDocument/2006/math">
+                    <m:f>
+                      <m:fPr>
+                        <m:ctrlPr>
+                          <a:rPr lang="en-US" i="1" smtClean="0">
+                            <a:latin typeface="Cambria Math" panose="02040503050406030204" pitchFamily="18" charset="0"/>
+                            <a:ea typeface="Cambria Math" panose="02040503050406030204" pitchFamily="18" charset="0"/>
+                          </a:rPr>
+                        </m:ctrlPr>
+                      </m:fPr>
+                      <m:num>
+                        <m:r>
+                          <m:rPr>
+                            <m:nor/>
+                          </m:rPr>
+                          <a:rPr lang="el-GR" dirty="0">
+                            <a:latin typeface="Cambria Math" panose="02040503050406030204" pitchFamily="18" charset="0"/>
+                            <a:ea typeface="Cambria Math" panose="02040503050406030204" pitchFamily="18" charset="0"/>
+                          </a:rPr>
+                          <m:t>β</m:t>
+                        </m:r>
+                      </m:num>
+                      <m:den>
+                        <m:r>
+                          <m:rPr>
+                            <m:nor/>
+                          </m:rPr>
+                          <a:rPr lang="el-GR" dirty="0">
+                            <a:latin typeface="Cambria Math" panose="02040503050406030204" pitchFamily="18" charset="0"/>
+                            <a:ea typeface="Cambria Math" panose="02040503050406030204" pitchFamily="18" charset="0"/>
+                          </a:rPr>
+                          <m:t>α</m:t>
+                        </m:r>
+                        <m:r>
+                          <a:rPr lang="en-US" b="0" i="1" dirty="0" smtClean="0">
+                            <a:latin typeface="Cambria Math" panose="02040503050406030204" pitchFamily="18" charset="0"/>
+                            <a:ea typeface="Cambria Math" panose="02040503050406030204" pitchFamily="18" charset="0"/>
+                          </a:rPr>
+                          <m:t>−1</m:t>
+                        </m:r>
+                      </m:den>
+                    </m:f>
+                    <m:r>
+                      <a:rPr lang="en-US" b="0" i="1" smtClean="0">
+                        <a:latin typeface="Cambria Math" panose="02040503050406030204" pitchFamily="18" charset="0"/>
+                        <a:ea typeface="Cambria Math" panose="02040503050406030204" pitchFamily="18" charset="0"/>
+                      </a:rPr>
+                      <m:t>=</m:t>
+                    </m:r>
+                    <m:f>
+                      <m:fPr>
+                        <m:ctrlPr>
+                          <a:rPr lang="en-US" b="0" i="1" smtClean="0">
+                            <a:latin typeface="Cambria Math" panose="02040503050406030204" pitchFamily="18" charset="0"/>
+                            <a:ea typeface="Cambria Math" panose="02040503050406030204" pitchFamily="18" charset="0"/>
+                          </a:rPr>
+                        </m:ctrlPr>
+                      </m:fPr>
+                      <m:num>
+                        <m:r>
+                          <a:rPr lang="en-US" b="0" i="1" smtClean="0">
+                            <a:latin typeface="Cambria Math" panose="02040503050406030204" pitchFamily="18" charset="0"/>
+                            <a:ea typeface="Cambria Math" panose="02040503050406030204" pitchFamily="18" charset="0"/>
+                          </a:rPr>
+                          <m:t>1</m:t>
+                        </m:r>
+                      </m:num>
+                      <m:den>
+                        <m:r>
+                          <a:rPr lang="en-US" b="0" i="1" smtClean="0">
+                            <a:latin typeface="Cambria Math" panose="02040503050406030204" pitchFamily="18" charset="0"/>
+                            <a:ea typeface="Cambria Math" panose="02040503050406030204" pitchFamily="18" charset="0"/>
+                          </a:rPr>
+                          <m:t>1</m:t>
+                        </m:r>
+                      </m:den>
+                    </m:f>
+                    <m:r>
+                      <a:rPr lang="en-US" b="0" i="1" smtClean="0">
+                        <a:latin typeface="Cambria Math" panose="02040503050406030204" pitchFamily="18" charset="0"/>
+                        <a:ea typeface="Cambria Math" panose="02040503050406030204" pitchFamily="18" charset="0"/>
+                      </a:rPr>
+                      <m:t>=1</m:t>
+                    </m:r>
+                  </m:oMath>
+                </a14:m>
+                <a:endParaRPr lang="en-US" dirty="0"/>
+              </a:p>
+              <a:p>
+                <a:pPr marL="0" indent="0">
+                  <a:buNone/>
+                </a:pPr>
+                <a:endParaRPr lang="en-US" dirty="0"/>
+              </a:p>
+              <a:p>
+                <a:pPr marL="0" indent="0">
+                  <a:buNone/>
+                </a:pPr>
+                <a:endParaRPr lang="en-US" dirty="0"/>
+              </a:p>
+              <a:p>
+                <a:pPr marL="0" indent="0">
+                  <a:buNone/>
+                </a:pPr>
+                <a:r>
+                  <a:rPr lang="en-US" dirty="0"/>
+                  <a:t>RHO </a:t>
+                </a:r>
+                <a:r>
+                  <a:rPr lang="en-US" dirty="0" err="1"/>
+                  <a:t>cov</a:t>
+                </a:r>
+                <a:r>
+                  <a:rPr lang="en-US" dirty="0"/>
+                  <a:t> info: mean=0.13 - </a:t>
+                </a:r>
+                <a:r>
+                  <a:rPr lang="en-US" dirty="0" err="1"/>
+                  <a:t>sd</a:t>
+                </a:r>
+                <a:r>
+                  <a:rPr lang="en-US" dirty="0"/>
+                  <a:t>=0.07</a:t>
+                </a:r>
+              </a:p>
+              <a:p>
+                <a:pPr marL="0" indent="0">
+                  <a:buNone/>
+                </a:pPr>
+                <a:r>
+                  <a:rPr lang="en-US" dirty="0"/>
+                  <a:t>SD </a:t>
+                </a:r>
+                <a:r>
+                  <a:rPr lang="en-US" dirty="0" err="1"/>
+                  <a:t>cov</a:t>
+                </a:r>
+                <a:r>
+                  <a:rPr lang="en-US" dirty="0"/>
+                  <a:t> info: mean=1.12 - </a:t>
+                </a:r>
+                <a:r>
+                  <a:rPr lang="en-US" dirty="0" err="1"/>
+                  <a:t>sd</a:t>
+                </a:r>
+                <a:r>
+                  <a:rPr lang="en-US" dirty="0"/>
+                  <a:t>=0.07</a:t>
+                </a:r>
+              </a:p>
+              <a:p>
+                <a:pPr marL="0" indent="0">
+                  <a:buNone/>
+                </a:pPr>
+                <a:endParaRPr lang="en-US" dirty="0"/>
+              </a:p>
+            </p:txBody>
+          </p:sp>
+        </mc:Choice>
+        <mc:Fallback>
+          <p:sp>
+            <p:nvSpPr>
+              <p:cNvPr id="3" name="Content Placeholder 2">
+                <a:extLst>
+                  <a:ext uri="{FF2B5EF4-FFF2-40B4-BE49-F238E27FC236}">
+                    <a16:creationId xmlns:a16="http://schemas.microsoft.com/office/drawing/2014/main" id="{ADCE720B-ACA3-4266-910F-47D85CD0AB03}"/>
+                  </a:ext>
+                </a:extLst>
+              </p:cNvPr>
+              <p:cNvSpPr>
+                <a:spLocks noGrp="1" noRot="1" noChangeAspect="1" noMove="1" noResize="1" noEditPoints="1" noAdjustHandles="1" noChangeArrowheads="1" noChangeShapeType="1" noTextEdit="1"/>
+              </p:cNvSpPr>
+              <p:nvPr>
+                <p:ph idx="1"/>
+              </p:nvPr>
+            </p:nvSpPr>
+            <p:spPr>
+              <a:blipFill>
+                <a:blip r:embed="rId2"/>
+                <a:stretch>
+                  <a:fillRect l="-1217" t="-700"/>
+                </a:stretch>
+              </a:blipFill>
+            </p:spPr>
+            <p:txBody>
+              <a:bodyPr/>
+              <a:lstStyle/>
+              <a:p>
+                <a:r>
+                  <a:rPr lang="en-US">
+                    <a:noFill/>
+                  </a:rPr>
+                  <a:t> </a:t>
+                </a:r>
+              </a:p>
+            </p:txBody>
+          </p:sp>
+        </mc:Fallback>
+      </mc:AlternateContent>
+      <p:pic>
+        <p:nvPicPr>
+          <p:cNvPr id="6" name="Picture 5">
+            <a:extLst>
+              <a:ext uri="{FF2B5EF4-FFF2-40B4-BE49-F238E27FC236}">
+                <a16:creationId xmlns:a16="http://schemas.microsoft.com/office/drawing/2014/main" id="{BC279BB7-2118-4FD4-9899-DC0EEDFBF1C1}"/>
+              </a:ext>
+            </a:extLst>
+          </p:cNvPr>
+          <p:cNvPicPr>
+            <a:picLocks noChangeAspect="1"/>
+          </p:cNvPicPr>
+          <p:nvPr/>
+        </p:nvPicPr>
+        <p:blipFill>
+          <a:blip r:embed="rId3"/>
+          <a:stretch>
+            <a:fillRect/>
+          </a:stretch>
+        </p:blipFill>
+        <p:spPr>
+          <a:xfrm>
+            <a:off x="7261321" y="3429000"/>
+            <a:ext cx="4800000" cy="3352381"/>
+          </a:xfrm>
+          <a:prstGeom prst="rect">
+            <a:avLst/>
+          </a:prstGeom>
+        </p:spPr>
+      </p:pic>
+    </p:spTree>
+    <p:extLst>
+      <p:ext uri="{BB962C8B-B14F-4D97-AF65-F5344CB8AC3E}">
+        <p14:creationId xmlns:p14="http://schemas.microsoft.com/office/powerpoint/2010/main" val="4241150814"/>
+      </p:ext>
+    </p:extLst>
+  </p:cSld>
+  <p:clrMapOvr>
+    <a:masterClrMapping/>
+  </p:clrMapOvr>
+</p:sld>
+</file>
+
+<file path=ppt/slides/slide16.xml><?xml version="1.0" encoding="utf-8"?>
+<p:sld xmlns:a="http://schemas.openxmlformats.org/drawingml/2006/main" xmlns:r="http://schemas.openxmlformats.org/officeDocument/2006/relationships" xmlns:p="http://schemas.openxmlformats.org/presentationml/2006/main">
+  <p:cSld>
+    <p:spTree>
+      <p:nvGrpSpPr>
+        <p:cNvPr id="1" name=""/>
+        <p:cNvGrpSpPr/>
+        <p:nvPr/>
+      </p:nvGrpSpPr>
+      <p:grpSpPr>
+        <a:xfrm>
+          <a:off x="0" y="0"/>
+          <a:ext cx="0" cy="0"/>
+          <a:chOff x="0" y="0"/>
+          <a:chExt cx="0" cy="0"/>
+        </a:xfrm>
+      </p:grpSpPr>
+      <p:sp>
+        <p:nvSpPr>
+          <p:cNvPr id="2" name="Title 1">
+            <a:extLst>
+              <a:ext uri="{FF2B5EF4-FFF2-40B4-BE49-F238E27FC236}">
+                <a16:creationId xmlns:a16="http://schemas.microsoft.com/office/drawing/2014/main" id="{CCBBFE0B-FB2B-4D56-953D-CF2B45A5FD5F}"/>
+              </a:ext>
+            </a:extLst>
+          </p:cNvPr>
+          <p:cNvSpPr>
+            <a:spLocks noGrp="1"/>
+          </p:cNvSpPr>
+          <p:nvPr>
+            <p:ph type="title"/>
+          </p:nvPr>
+        </p:nvSpPr>
+        <p:spPr/>
+        <p:txBody>
+          <a:bodyPr/>
+          <a:lstStyle/>
+          <a:p>
+            <a:r>
+              <a:rPr lang="en-US" dirty="0"/>
+              <a:t>Synthetic 0.2 </a:t>
+            </a:r>
+          </a:p>
+        </p:txBody>
+      </p:sp>
+      <mc:AlternateContent xmlns:mc="http://schemas.openxmlformats.org/markup-compatibility/2006">
+        <mc:Choice xmlns:a14="http://schemas.microsoft.com/office/drawing/2010/main" Requires="a14">
+          <p:sp>
+            <p:nvSpPr>
+              <p:cNvPr id="3" name="Content Placeholder 2">
+                <a:extLst>
+                  <a:ext uri="{FF2B5EF4-FFF2-40B4-BE49-F238E27FC236}">
+                    <a16:creationId xmlns:a16="http://schemas.microsoft.com/office/drawing/2014/main" id="{ADCE720B-ACA3-4266-910F-47D85CD0AB03}"/>
+                  </a:ext>
+                </a:extLst>
+              </p:cNvPr>
+              <p:cNvSpPr>
+                <a:spLocks noGrp="1"/>
+              </p:cNvSpPr>
+              <p:nvPr>
+                <p:ph idx="1"/>
+              </p:nvPr>
+            </p:nvSpPr>
+            <p:spPr/>
+            <p:txBody>
+              <a:bodyPr/>
+              <a:lstStyle/>
+              <a:p>
+                <a:pPr marL="0" indent="0">
+                  <a:buNone/>
+                </a:pPr>
+                <a:r>
+                  <a:rPr lang="el-GR" dirty="0">
+                    <a:latin typeface="Cambria Math" panose="02040503050406030204" pitchFamily="18" charset="0"/>
+                    <a:ea typeface="Cambria Math" panose="02040503050406030204" pitchFamily="18" charset="0"/>
+                  </a:rPr>
+                  <a:t>ρ</a:t>
+                </a:r>
+                <a:r>
+                  <a:rPr lang="en-US" dirty="0">
+                    <a:latin typeface="Cambria Math" panose="02040503050406030204" pitchFamily="18" charset="0"/>
+                    <a:ea typeface="Cambria Math" panose="02040503050406030204" pitchFamily="18" charset="0"/>
+                  </a:rPr>
+                  <a:t>= beta ( </a:t>
+                </a:r>
+                <a:r>
+                  <a:rPr lang="el-GR" dirty="0">
+                    <a:latin typeface="Cambria Math" panose="02040503050406030204" pitchFamily="18" charset="0"/>
+                    <a:ea typeface="Cambria Math" panose="02040503050406030204" pitchFamily="18" charset="0"/>
+                  </a:rPr>
+                  <a:t>α</a:t>
+                </a:r>
+                <a:r>
+                  <a:rPr lang="en-US" dirty="0">
+                    <a:latin typeface="Cambria Math" panose="02040503050406030204" pitchFamily="18" charset="0"/>
+                    <a:ea typeface="Cambria Math" panose="02040503050406030204" pitchFamily="18" charset="0"/>
+                  </a:rPr>
+                  <a:t>=1, </a:t>
+                </a:r>
+                <a:r>
+                  <a:rPr lang="el-GR" dirty="0">
+                    <a:latin typeface="Cambria Math" panose="02040503050406030204" pitchFamily="18" charset="0"/>
+                    <a:ea typeface="Cambria Math" panose="02040503050406030204" pitchFamily="18" charset="0"/>
+                  </a:rPr>
+                  <a:t>β</a:t>
+                </a:r>
+                <a:r>
+                  <a:rPr lang="en-US" dirty="0">
+                    <a:latin typeface="Cambria Math" panose="02040503050406030204" pitchFamily="18" charset="0"/>
+                    <a:ea typeface="Cambria Math" panose="02040503050406030204" pitchFamily="18" charset="0"/>
+                  </a:rPr>
+                  <a:t>=4)  → Mean = </a:t>
+                </a:r>
+                <a14:m>
+                  <m:oMath xmlns:m="http://schemas.openxmlformats.org/officeDocument/2006/math">
+                    <m:f>
+                      <m:fPr>
+                        <m:ctrlPr>
+                          <a:rPr lang="en-US" i="1" smtClean="0">
+                            <a:latin typeface="Cambria Math" panose="02040503050406030204" pitchFamily="18" charset="0"/>
+                            <a:ea typeface="Cambria Math" panose="02040503050406030204" pitchFamily="18" charset="0"/>
+                          </a:rPr>
+                        </m:ctrlPr>
+                      </m:fPr>
+                      <m:num>
+                        <m:r>
+                          <m:rPr>
+                            <m:nor/>
+                          </m:rPr>
+                          <a:rPr lang="el-GR" dirty="0">
+                            <a:latin typeface="Cambria Math" panose="02040503050406030204" pitchFamily="18" charset="0"/>
+                            <a:ea typeface="Cambria Math" panose="02040503050406030204" pitchFamily="18" charset="0"/>
+                          </a:rPr>
+                          <m:t>α</m:t>
+                        </m:r>
+                      </m:num>
+                      <m:den>
+                        <m:r>
+                          <m:rPr>
+                            <m:nor/>
+                          </m:rPr>
+                          <a:rPr lang="el-GR" dirty="0">
+                            <a:latin typeface="Cambria Math" panose="02040503050406030204" pitchFamily="18" charset="0"/>
+                            <a:ea typeface="Cambria Math" panose="02040503050406030204" pitchFamily="18" charset="0"/>
+                          </a:rPr>
+                          <m:t>α</m:t>
+                        </m:r>
+                        <m:r>
+                          <a:rPr lang="en-US" b="0" i="1" dirty="0" smtClean="0">
+                            <a:latin typeface="Cambria Math" panose="02040503050406030204" pitchFamily="18" charset="0"/>
+                            <a:ea typeface="Cambria Math" panose="02040503050406030204" pitchFamily="18" charset="0"/>
+                          </a:rPr>
+                          <m:t>+</m:t>
+                        </m:r>
+                        <m:r>
+                          <m:rPr>
+                            <m:nor/>
+                          </m:rPr>
+                          <a:rPr lang="el-GR" dirty="0">
+                            <a:latin typeface="Cambria Math" panose="02040503050406030204" pitchFamily="18" charset="0"/>
+                            <a:ea typeface="Cambria Math" panose="02040503050406030204" pitchFamily="18" charset="0"/>
+                          </a:rPr>
+                          <m:t>β</m:t>
+                        </m:r>
+                      </m:den>
+                    </m:f>
+                    <m:r>
+                      <a:rPr lang="en-US" b="0" i="1" smtClean="0">
+                        <a:latin typeface="Cambria Math" panose="02040503050406030204" pitchFamily="18" charset="0"/>
+                        <a:ea typeface="Cambria Math" panose="02040503050406030204" pitchFamily="18" charset="0"/>
+                      </a:rPr>
+                      <m:t>=</m:t>
+                    </m:r>
+                    <m:f>
+                      <m:fPr>
+                        <m:ctrlPr>
+                          <a:rPr lang="en-US" b="0" i="1" smtClean="0">
+                            <a:latin typeface="Cambria Math" panose="02040503050406030204" pitchFamily="18" charset="0"/>
+                            <a:ea typeface="Cambria Math" panose="02040503050406030204" pitchFamily="18" charset="0"/>
+                          </a:rPr>
+                        </m:ctrlPr>
+                      </m:fPr>
+                      <m:num>
+                        <m:r>
+                          <a:rPr lang="en-US" b="0" i="1" smtClean="0">
+                            <a:latin typeface="Cambria Math" panose="02040503050406030204" pitchFamily="18" charset="0"/>
+                            <a:ea typeface="Cambria Math" panose="02040503050406030204" pitchFamily="18" charset="0"/>
+                          </a:rPr>
+                          <m:t>1</m:t>
+                        </m:r>
+                      </m:num>
+                      <m:den>
+                        <m:r>
+                          <a:rPr lang="en-US" b="0" i="1" smtClean="0">
+                            <a:latin typeface="Cambria Math" panose="02040503050406030204" pitchFamily="18" charset="0"/>
+                            <a:ea typeface="Cambria Math" panose="02040503050406030204" pitchFamily="18" charset="0"/>
+                          </a:rPr>
+                          <m:t>5</m:t>
+                        </m:r>
+                      </m:den>
+                    </m:f>
+                  </m:oMath>
+                </a14:m>
+                <a:endParaRPr lang="en-US" dirty="0"/>
+              </a:p>
+              <a:p>
+                <a:pPr marL="0" indent="0">
+                  <a:buNone/>
+                </a:pPr>
+                <a:r>
+                  <a:rPr lang="el-GR" dirty="0">
+                    <a:latin typeface="Cambria Math" panose="02040503050406030204" pitchFamily="18" charset="0"/>
+                    <a:ea typeface="Cambria Math" panose="02040503050406030204" pitchFamily="18" charset="0"/>
+                  </a:rPr>
+                  <a:t>σ</a:t>
+                </a:r>
+                <a:r>
+                  <a:rPr lang="en-US" dirty="0">
+                    <a:latin typeface="Cambria Math" panose="02040503050406030204" pitchFamily="18" charset="0"/>
+                    <a:ea typeface="Cambria Math" panose="02040503050406030204" pitchFamily="18" charset="0"/>
+                  </a:rPr>
+                  <a:t>= beta ( </a:t>
+                </a:r>
+                <a:r>
+                  <a:rPr lang="el-GR" dirty="0">
+                    <a:latin typeface="Cambria Math" panose="02040503050406030204" pitchFamily="18" charset="0"/>
+                    <a:ea typeface="Cambria Math" panose="02040503050406030204" pitchFamily="18" charset="0"/>
+                  </a:rPr>
+                  <a:t>α</a:t>
+                </a:r>
+                <a:r>
+                  <a:rPr lang="en-US" dirty="0">
+                    <a:latin typeface="Cambria Math" panose="02040503050406030204" pitchFamily="18" charset="0"/>
+                    <a:ea typeface="Cambria Math" panose="02040503050406030204" pitchFamily="18" charset="0"/>
+                  </a:rPr>
+                  <a:t>=2, </a:t>
+                </a:r>
+                <a:r>
+                  <a:rPr lang="el-GR" dirty="0">
+                    <a:latin typeface="Cambria Math" panose="02040503050406030204" pitchFamily="18" charset="0"/>
+                    <a:ea typeface="Cambria Math" panose="02040503050406030204" pitchFamily="18" charset="0"/>
+                  </a:rPr>
+                  <a:t>β</a:t>
+                </a:r>
+                <a:r>
+                  <a:rPr lang="en-US" dirty="0">
+                    <a:latin typeface="Cambria Math" panose="02040503050406030204" pitchFamily="18" charset="0"/>
+                    <a:ea typeface="Cambria Math" panose="02040503050406030204" pitchFamily="18" charset="0"/>
+                  </a:rPr>
+                  <a:t>=1)  → Mean = </a:t>
+                </a:r>
+                <a14:m>
+                  <m:oMath xmlns:m="http://schemas.openxmlformats.org/officeDocument/2006/math">
+                    <m:f>
+                      <m:fPr>
+                        <m:ctrlPr>
+                          <a:rPr lang="en-US" i="1" smtClean="0">
+                            <a:latin typeface="Cambria Math" panose="02040503050406030204" pitchFamily="18" charset="0"/>
+                            <a:ea typeface="Cambria Math" panose="02040503050406030204" pitchFamily="18" charset="0"/>
+                          </a:rPr>
+                        </m:ctrlPr>
+                      </m:fPr>
+                      <m:num>
+                        <m:r>
+                          <m:rPr>
+                            <m:nor/>
+                          </m:rPr>
+                          <a:rPr lang="el-GR" dirty="0">
+                            <a:latin typeface="Cambria Math" panose="02040503050406030204" pitchFamily="18" charset="0"/>
+                            <a:ea typeface="Cambria Math" panose="02040503050406030204" pitchFamily="18" charset="0"/>
+                          </a:rPr>
+                          <m:t>β</m:t>
+                        </m:r>
+                      </m:num>
+                      <m:den>
+                        <m:r>
+                          <m:rPr>
+                            <m:nor/>
+                          </m:rPr>
+                          <a:rPr lang="el-GR" dirty="0">
+                            <a:latin typeface="Cambria Math" panose="02040503050406030204" pitchFamily="18" charset="0"/>
+                            <a:ea typeface="Cambria Math" panose="02040503050406030204" pitchFamily="18" charset="0"/>
+                          </a:rPr>
+                          <m:t>α</m:t>
+                        </m:r>
+                        <m:r>
+                          <a:rPr lang="en-US" b="0" i="1" dirty="0" smtClean="0">
+                            <a:latin typeface="Cambria Math" panose="02040503050406030204" pitchFamily="18" charset="0"/>
+                            <a:ea typeface="Cambria Math" panose="02040503050406030204" pitchFamily="18" charset="0"/>
+                          </a:rPr>
+                          <m:t>−1</m:t>
+                        </m:r>
+                      </m:den>
+                    </m:f>
+                    <m:r>
+                      <a:rPr lang="en-US" b="0" i="1" smtClean="0">
+                        <a:latin typeface="Cambria Math" panose="02040503050406030204" pitchFamily="18" charset="0"/>
+                        <a:ea typeface="Cambria Math" panose="02040503050406030204" pitchFamily="18" charset="0"/>
+                      </a:rPr>
+                      <m:t>=</m:t>
+                    </m:r>
+                    <m:f>
+                      <m:fPr>
+                        <m:ctrlPr>
+                          <a:rPr lang="en-US" b="0" i="1" smtClean="0">
+                            <a:latin typeface="Cambria Math" panose="02040503050406030204" pitchFamily="18" charset="0"/>
+                            <a:ea typeface="Cambria Math" panose="02040503050406030204" pitchFamily="18" charset="0"/>
+                          </a:rPr>
+                        </m:ctrlPr>
+                      </m:fPr>
+                      <m:num>
+                        <m:r>
+                          <a:rPr lang="en-US" b="0" i="1" smtClean="0">
+                            <a:latin typeface="Cambria Math" panose="02040503050406030204" pitchFamily="18" charset="0"/>
+                            <a:ea typeface="Cambria Math" panose="02040503050406030204" pitchFamily="18" charset="0"/>
+                          </a:rPr>
+                          <m:t>1</m:t>
+                        </m:r>
+                      </m:num>
+                      <m:den>
+                        <m:r>
+                          <a:rPr lang="en-US" b="0" i="1" smtClean="0">
+                            <a:latin typeface="Cambria Math" panose="02040503050406030204" pitchFamily="18" charset="0"/>
+                            <a:ea typeface="Cambria Math" panose="02040503050406030204" pitchFamily="18" charset="0"/>
+                          </a:rPr>
+                          <m:t>1</m:t>
+                        </m:r>
+                      </m:den>
+                    </m:f>
+                    <m:r>
+                      <a:rPr lang="en-US" b="0" i="1" smtClean="0">
+                        <a:latin typeface="Cambria Math" panose="02040503050406030204" pitchFamily="18" charset="0"/>
+                        <a:ea typeface="Cambria Math" panose="02040503050406030204" pitchFamily="18" charset="0"/>
+                      </a:rPr>
+                      <m:t>=1</m:t>
+                    </m:r>
+                  </m:oMath>
+                </a14:m>
+                <a:endParaRPr lang="en-US" b="0" dirty="0">
+                  <a:latin typeface="Cambria Math" panose="02040503050406030204" pitchFamily="18" charset="0"/>
+                  <a:ea typeface="Cambria Math" panose="02040503050406030204" pitchFamily="18" charset="0"/>
+                </a:endParaRPr>
+              </a:p>
+              <a:p>
+                <a:pPr marL="0" indent="0">
+                  <a:buNone/>
+                </a:pPr>
+                <a:endParaRPr lang="en-US" dirty="0"/>
+              </a:p>
+              <a:p>
+                <a:pPr marL="0" indent="0">
+                  <a:buNone/>
+                </a:pPr>
+                <a:endParaRPr lang="en-US" dirty="0"/>
+              </a:p>
+              <a:p>
+                <a:pPr marL="0" indent="0">
+                  <a:buNone/>
+                </a:pPr>
+                <a:r>
+                  <a:rPr lang="en-US" dirty="0"/>
+                  <a:t>RHO </a:t>
+                </a:r>
+                <a:r>
+                  <a:rPr lang="en-US" dirty="0" err="1"/>
+                  <a:t>cov</a:t>
+                </a:r>
+                <a:r>
+                  <a:rPr lang="en-US" dirty="0"/>
+                  <a:t> info: mean=0.12 - </a:t>
+                </a:r>
+                <a:r>
+                  <a:rPr lang="en-US" dirty="0" err="1"/>
+                  <a:t>sd</a:t>
+                </a:r>
+                <a:r>
+                  <a:rPr lang="en-US" dirty="0"/>
+                  <a:t>=0.05</a:t>
+                </a:r>
+              </a:p>
+              <a:p>
+                <a:pPr marL="0" indent="0">
+                  <a:buNone/>
+                </a:pPr>
+                <a:r>
+                  <a:rPr lang="en-US" dirty="0"/>
+                  <a:t>SD </a:t>
+                </a:r>
+                <a:r>
+                  <a:rPr lang="en-US" dirty="0" err="1"/>
+                  <a:t>cov</a:t>
+                </a:r>
+                <a:r>
+                  <a:rPr lang="en-US" dirty="0"/>
+                  <a:t> info: mean=1.12 - </a:t>
+                </a:r>
+                <a:r>
+                  <a:rPr lang="en-US" dirty="0" err="1"/>
+                  <a:t>sd</a:t>
+                </a:r>
+                <a:r>
+                  <a:rPr lang="en-US" dirty="0"/>
+                  <a:t>=0.08</a:t>
+                </a:r>
+              </a:p>
+              <a:p>
+                <a:pPr marL="0" indent="0">
+                  <a:buNone/>
+                </a:pPr>
+                <a:endParaRPr lang="en-US" dirty="0"/>
+              </a:p>
+            </p:txBody>
+          </p:sp>
+        </mc:Choice>
+        <mc:Fallback>
+          <p:sp>
+            <p:nvSpPr>
+              <p:cNvPr id="3" name="Content Placeholder 2">
+                <a:extLst>
+                  <a:ext uri="{FF2B5EF4-FFF2-40B4-BE49-F238E27FC236}">
+                    <a16:creationId xmlns:a16="http://schemas.microsoft.com/office/drawing/2014/main" id="{ADCE720B-ACA3-4266-910F-47D85CD0AB03}"/>
+                  </a:ext>
+                </a:extLst>
+              </p:cNvPr>
+              <p:cNvSpPr>
+                <a:spLocks noGrp="1" noRot="1" noChangeAspect="1" noMove="1" noResize="1" noEditPoints="1" noAdjustHandles="1" noChangeArrowheads="1" noChangeShapeType="1" noTextEdit="1"/>
+              </p:cNvSpPr>
+              <p:nvPr>
+                <p:ph idx="1"/>
+              </p:nvPr>
+            </p:nvSpPr>
+            <p:spPr>
+              <a:blipFill>
+                <a:blip r:embed="rId2"/>
+                <a:stretch>
+                  <a:fillRect l="-1217" t="-700"/>
+                </a:stretch>
+              </a:blipFill>
+            </p:spPr>
+            <p:txBody>
+              <a:bodyPr/>
+              <a:lstStyle/>
+              <a:p>
+                <a:r>
+                  <a:rPr lang="en-US">
+                    <a:noFill/>
+                  </a:rPr>
+                  <a:t> </a:t>
+                </a:r>
+              </a:p>
+            </p:txBody>
+          </p:sp>
+        </mc:Fallback>
+      </mc:AlternateContent>
+      <p:pic>
+        <p:nvPicPr>
+          <p:cNvPr id="6" name="Picture 5">
+            <a:extLst>
+              <a:ext uri="{FF2B5EF4-FFF2-40B4-BE49-F238E27FC236}">
+                <a16:creationId xmlns:a16="http://schemas.microsoft.com/office/drawing/2014/main" id="{0D84F652-3085-4256-B292-69CCFCAFBF77}"/>
+              </a:ext>
+            </a:extLst>
+          </p:cNvPr>
+          <p:cNvPicPr>
+            <a:picLocks noChangeAspect="1"/>
+          </p:cNvPicPr>
+          <p:nvPr/>
+        </p:nvPicPr>
+        <p:blipFill>
+          <a:blip r:embed="rId3"/>
+          <a:stretch>
+            <a:fillRect/>
+          </a:stretch>
+        </p:blipFill>
+        <p:spPr>
+          <a:xfrm>
+            <a:off x="6898488" y="3429000"/>
+            <a:ext cx="4455312" cy="3341484"/>
+          </a:xfrm>
+          <a:prstGeom prst="rect">
+            <a:avLst/>
+          </a:prstGeom>
+        </p:spPr>
+      </p:pic>
+    </p:spTree>
+    <p:extLst>
+      <p:ext uri="{BB962C8B-B14F-4D97-AF65-F5344CB8AC3E}">
+        <p14:creationId xmlns:p14="http://schemas.microsoft.com/office/powerpoint/2010/main" val="3443346089"/>
       </p:ext>
     </p:extLst>
   </p:cSld>

</xml_diff>